<commit_message>
Updating and Refining AddAuthorization
Still busy will finish it today.
</commit_message>
<xml_diff>
--- a/Authentication - B.pptx
+++ b/Authentication - B.pptx
@@ -301,7 +301,8 @@
           <a:p>
             <a:fld id="{BC8B1206-7415-4CAA-BABF-4B2FCC8828A3}" type="datetimeFigureOut">
               <a:rPr lang="en-ZA" smtClean="0"/>
-              <a:t>2015-04-14</a:t>
+              <a:pPr/>
+              <a:t>2015/04/16</a:t>
             </a:fld>
             <a:endParaRPr lang="en-ZA"/>
           </a:p>
@@ -343,6 +344,7 @@
           <a:p>
             <a:fld id="{FF1E2881-C859-4715-83A0-919D8B92F780}" type="slidenum">
               <a:rPr lang="en-ZA" smtClean="0"/>
+              <a:pPr/>
               <a:t>‹#›</a:t>
             </a:fld>
             <a:endParaRPr lang="en-ZA"/>
@@ -352,7 +354,7 @@
     </p:spTree>
     <p:extLst>
       <p:ext uri="{BB962C8B-B14F-4D97-AF65-F5344CB8AC3E}">
-        <p14:creationId xmlns:p14="http://schemas.microsoft.com/office/powerpoint/2010/main" val="32494294"/>
+        <p14:creationId xmlns:p14="http://schemas.microsoft.com/office/powerpoint/2010/main" xmlns="" val="32494294"/>
       </p:ext>
     </p:extLst>
   </p:cSld>
@@ -471,7 +473,8 @@
           <a:p>
             <a:fld id="{BC8B1206-7415-4CAA-BABF-4B2FCC8828A3}" type="datetimeFigureOut">
               <a:rPr lang="en-ZA" smtClean="0"/>
-              <a:t>2015-04-14</a:t>
+              <a:pPr/>
+              <a:t>2015/04/16</a:t>
             </a:fld>
             <a:endParaRPr lang="en-ZA"/>
           </a:p>
@@ -513,6 +516,7 @@
           <a:p>
             <a:fld id="{FF1E2881-C859-4715-83A0-919D8B92F780}" type="slidenum">
               <a:rPr lang="en-ZA" smtClean="0"/>
+              <a:pPr/>
               <a:t>‹#›</a:t>
             </a:fld>
             <a:endParaRPr lang="en-ZA"/>
@@ -522,7 +526,7 @@
     </p:spTree>
     <p:extLst>
       <p:ext uri="{BB962C8B-B14F-4D97-AF65-F5344CB8AC3E}">
-        <p14:creationId xmlns:p14="http://schemas.microsoft.com/office/powerpoint/2010/main" val="1407415046"/>
+        <p14:creationId xmlns:p14="http://schemas.microsoft.com/office/powerpoint/2010/main" xmlns="" val="1407415046"/>
       </p:ext>
     </p:extLst>
   </p:cSld>
@@ -651,7 +655,8 @@
           <a:p>
             <a:fld id="{BC8B1206-7415-4CAA-BABF-4B2FCC8828A3}" type="datetimeFigureOut">
               <a:rPr lang="en-ZA" smtClean="0"/>
-              <a:t>2015-04-14</a:t>
+              <a:pPr/>
+              <a:t>2015/04/16</a:t>
             </a:fld>
             <a:endParaRPr lang="en-ZA"/>
           </a:p>
@@ -693,6 +698,7 @@
           <a:p>
             <a:fld id="{FF1E2881-C859-4715-83A0-919D8B92F780}" type="slidenum">
               <a:rPr lang="en-ZA" smtClean="0"/>
+              <a:pPr/>
               <a:t>‹#›</a:t>
             </a:fld>
             <a:endParaRPr lang="en-ZA"/>
@@ -702,7 +708,7 @@
     </p:spTree>
     <p:extLst>
       <p:ext uri="{BB962C8B-B14F-4D97-AF65-F5344CB8AC3E}">
-        <p14:creationId xmlns:p14="http://schemas.microsoft.com/office/powerpoint/2010/main" val="3489674815"/>
+        <p14:creationId xmlns:p14="http://schemas.microsoft.com/office/powerpoint/2010/main" xmlns="" val="3489674815"/>
       </p:ext>
     </p:extLst>
   </p:cSld>
@@ -821,7 +827,8 @@
           <a:p>
             <a:fld id="{BC8B1206-7415-4CAA-BABF-4B2FCC8828A3}" type="datetimeFigureOut">
               <a:rPr lang="en-ZA" smtClean="0"/>
-              <a:t>2015-04-14</a:t>
+              <a:pPr/>
+              <a:t>2015/04/16</a:t>
             </a:fld>
             <a:endParaRPr lang="en-ZA"/>
           </a:p>
@@ -863,6 +870,7 @@
           <a:p>
             <a:fld id="{FF1E2881-C859-4715-83A0-919D8B92F780}" type="slidenum">
               <a:rPr lang="en-ZA" smtClean="0"/>
+              <a:pPr/>
               <a:t>‹#›</a:t>
             </a:fld>
             <a:endParaRPr lang="en-ZA"/>
@@ -872,7 +880,7 @@
     </p:spTree>
     <p:extLst>
       <p:ext uri="{BB962C8B-B14F-4D97-AF65-F5344CB8AC3E}">
-        <p14:creationId xmlns:p14="http://schemas.microsoft.com/office/powerpoint/2010/main" val="3922563659"/>
+        <p14:creationId xmlns:p14="http://schemas.microsoft.com/office/powerpoint/2010/main" xmlns="" val="3922563659"/>
       </p:ext>
     </p:extLst>
   </p:cSld>
@@ -1067,7 +1075,8 @@
           <a:p>
             <a:fld id="{BC8B1206-7415-4CAA-BABF-4B2FCC8828A3}" type="datetimeFigureOut">
               <a:rPr lang="en-ZA" smtClean="0"/>
-              <a:t>2015-04-14</a:t>
+              <a:pPr/>
+              <a:t>2015/04/16</a:t>
             </a:fld>
             <a:endParaRPr lang="en-ZA"/>
           </a:p>
@@ -1109,6 +1118,7 @@
           <a:p>
             <a:fld id="{FF1E2881-C859-4715-83A0-919D8B92F780}" type="slidenum">
               <a:rPr lang="en-ZA" smtClean="0"/>
+              <a:pPr/>
               <a:t>‹#›</a:t>
             </a:fld>
             <a:endParaRPr lang="en-ZA"/>
@@ -1118,7 +1128,7 @@
     </p:spTree>
     <p:extLst>
       <p:ext uri="{BB962C8B-B14F-4D97-AF65-F5344CB8AC3E}">
-        <p14:creationId xmlns:p14="http://schemas.microsoft.com/office/powerpoint/2010/main" val="2839950182"/>
+        <p14:creationId xmlns:p14="http://schemas.microsoft.com/office/powerpoint/2010/main" xmlns="" val="2839950182"/>
       </p:ext>
     </p:extLst>
   </p:cSld>
@@ -1355,7 +1365,8 @@
           <a:p>
             <a:fld id="{BC8B1206-7415-4CAA-BABF-4B2FCC8828A3}" type="datetimeFigureOut">
               <a:rPr lang="en-ZA" smtClean="0"/>
-              <a:t>2015-04-14</a:t>
+              <a:pPr/>
+              <a:t>2015/04/16</a:t>
             </a:fld>
             <a:endParaRPr lang="en-ZA"/>
           </a:p>
@@ -1397,6 +1408,7 @@
           <a:p>
             <a:fld id="{FF1E2881-C859-4715-83A0-919D8B92F780}" type="slidenum">
               <a:rPr lang="en-ZA" smtClean="0"/>
+              <a:pPr/>
               <a:t>‹#›</a:t>
             </a:fld>
             <a:endParaRPr lang="en-ZA"/>
@@ -1406,7 +1418,7 @@
     </p:spTree>
     <p:extLst>
       <p:ext uri="{BB962C8B-B14F-4D97-AF65-F5344CB8AC3E}">
-        <p14:creationId xmlns:p14="http://schemas.microsoft.com/office/powerpoint/2010/main" val="3287254344"/>
+        <p14:creationId xmlns:p14="http://schemas.microsoft.com/office/powerpoint/2010/main" xmlns="" val="3287254344"/>
       </p:ext>
     </p:extLst>
   </p:cSld>
@@ -1777,7 +1789,8 @@
           <a:p>
             <a:fld id="{BC8B1206-7415-4CAA-BABF-4B2FCC8828A3}" type="datetimeFigureOut">
               <a:rPr lang="en-ZA" smtClean="0"/>
-              <a:t>2015-04-14</a:t>
+              <a:pPr/>
+              <a:t>2015/04/16</a:t>
             </a:fld>
             <a:endParaRPr lang="en-ZA"/>
           </a:p>
@@ -1819,6 +1832,7 @@
           <a:p>
             <a:fld id="{FF1E2881-C859-4715-83A0-919D8B92F780}" type="slidenum">
               <a:rPr lang="en-ZA" smtClean="0"/>
+              <a:pPr/>
               <a:t>‹#›</a:t>
             </a:fld>
             <a:endParaRPr lang="en-ZA"/>
@@ -1828,7 +1842,7 @@
     </p:spTree>
     <p:extLst>
       <p:ext uri="{BB962C8B-B14F-4D97-AF65-F5344CB8AC3E}">
-        <p14:creationId xmlns:p14="http://schemas.microsoft.com/office/powerpoint/2010/main" val="2992548387"/>
+        <p14:creationId xmlns:p14="http://schemas.microsoft.com/office/powerpoint/2010/main" xmlns="" val="2992548387"/>
       </p:ext>
     </p:extLst>
   </p:cSld>
@@ -1895,7 +1909,8 @@
           <a:p>
             <a:fld id="{BC8B1206-7415-4CAA-BABF-4B2FCC8828A3}" type="datetimeFigureOut">
               <a:rPr lang="en-ZA" smtClean="0"/>
-              <a:t>2015-04-14</a:t>
+              <a:pPr/>
+              <a:t>2015/04/16</a:t>
             </a:fld>
             <a:endParaRPr lang="en-ZA"/>
           </a:p>
@@ -1937,6 +1952,7 @@
           <a:p>
             <a:fld id="{FF1E2881-C859-4715-83A0-919D8B92F780}" type="slidenum">
               <a:rPr lang="en-ZA" smtClean="0"/>
+              <a:pPr/>
               <a:t>‹#›</a:t>
             </a:fld>
             <a:endParaRPr lang="en-ZA"/>
@@ -1946,7 +1962,7 @@
     </p:spTree>
     <p:extLst>
       <p:ext uri="{BB962C8B-B14F-4D97-AF65-F5344CB8AC3E}">
-        <p14:creationId xmlns:p14="http://schemas.microsoft.com/office/powerpoint/2010/main" val="4081995342"/>
+        <p14:creationId xmlns:p14="http://schemas.microsoft.com/office/powerpoint/2010/main" xmlns="" val="4081995342"/>
       </p:ext>
     </p:extLst>
   </p:cSld>
@@ -1990,7 +2006,8 @@
           <a:p>
             <a:fld id="{BC8B1206-7415-4CAA-BABF-4B2FCC8828A3}" type="datetimeFigureOut">
               <a:rPr lang="en-ZA" smtClean="0"/>
-              <a:t>2015-04-14</a:t>
+              <a:pPr/>
+              <a:t>2015/04/16</a:t>
             </a:fld>
             <a:endParaRPr lang="en-ZA"/>
           </a:p>
@@ -2032,6 +2049,7 @@
           <a:p>
             <a:fld id="{FF1E2881-C859-4715-83A0-919D8B92F780}" type="slidenum">
               <a:rPr lang="en-ZA" smtClean="0"/>
+              <a:pPr/>
               <a:t>‹#›</a:t>
             </a:fld>
             <a:endParaRPr lang="en-ZA"/>
@@ -2041,7 +2059,7 @@
     </p:spTree>
     <p:extLst>
       <p:ext uri="{BB962C8B-B14F-4D97-AF65-F5344CB8AC3E}">
-        <p14:creationId xmlns:p14="http://schemas.microsoft.com/office/powerpoint/2010/main" val="1897818696"/>
+        <p14:creationId xmlns:p14="http://schemas.microsoft.com/office/powerpoint/2010/main" xmlns="" val="1897818696"/>
       </p:ext>
     </p:extLst>
   </p:cSld>
@@ -2267,7 +2285,8 @@
           <a:p>
             <a:fld id="{BC8B1206-7415-4CAA-BABF-4B2FCC8828A3}" type="datetimeFigureOut">
               <a:rPr lang="en-ZA" smtClean="0"/>
-              <a:t>2015-04-14</a:t>
+              <a:pPr/>
+              <a:t>2015/04/16</a:t>
             </a:fld>
             <a:endParaRPr lang="en-ZA"/>
           </a:p>
@@ -2309,6 +2328,7 @@
           <a:p>
             <a:fld id="{FF1E2881-C859-4715-83A0-919D8B92F780}" type="slidenum">
               <a:rPr lang="en-ZA" smtClean="0"/>
+              <a:pPr/>
               <a:t>‹#›</a:t>
             </a:fld>
             <a:endParaRPr lang="en-ZA"/>
@@ -2318,7 +2338,7 @@
     </p:spTree>
     <p:extLst>
       <p:ext uri="{BB962C8B-B14F-4D97-AF65-F5344CB8AC3E}">
-        <p14:creationId xmlns:p14="http://schemas.microsoft.com/office/powerpoint/2010/main" val="2349542582"/>
+        <p14:creationId xmlns:p14="http://schemas.microsoft.com/office/powerpoint/2010/main" xmlns="" val="2349542582"/>
       </p:ext>
     </p:extLst>
   </p:cSld>
@@ -2520,7 +2540,8 @@
           <a:p>
             <a:fld id="{BC8B1206-7415-4CAA-BABF-4B2FCC8828A3}" type="datetimeFigureOut">
               <a:rPr lang="en-ZA" smtClean="0"/>
-              <a:t>2015-04-14</a:t>
+              <a:pPr/>
+              <a:t>2015/04/16</a:t>
             </a:fld>
             <a:endParaRPr lang="en-ZA"/>
           </a:p>
@@ -2562,6 +2583,7 @@
           <a:p>
             <a:fld id="{FF1E2881-C859-4715-83A0-919D8B92F780}" type="slidenum">
               <a:rPr lang="en-ZA" smtClean="0"/>
+              <a:pPr/>
               <a:t>‹#›</a:t>
             </a:fld>
             <a:endParaRPr lang="en-ZA"/>
@@ -2571,7 +2593,7 @@
     </p:spTree>
     <p:extLst>
       <p:ext uri="{BB962C8B-B14F-4D97-AF65-F5344CB8AC3E}">
-        <p14:creationId xmlns:p14="http://schemas.microsoft.com/office/powerpoint/2010/main" val="1781508516"/>
+        <p14:creationId xmlns:p14="http://schemas.microsoft.com/office/powerpoint/2010/main" xmlns="" val="1781508516"/>
       </p:ext>
     </p:extLst>
   </p:cSld>
@@ -2742,7 +2764,8 @@
           <a:p>
             <a:fld id="{BC8B1206-7415-4CAA-BABF-4B2FCC8828A3}" type="datetimeFigureOut">
               <a:rPr lang="en-ZA" smtClean="0"/>
-              <a:t>2015-04-14</a:t>
+              <a:pPr/>
+              <a:t>2015/04/16</a:t>
             </a:fld>
             <a:endParaRPr lang="en-ZA"/>
           </a:p>
@@ -2820,6 +2843,7 @@
           <a:p>
             <a:fld id="{FF1E2881-C859-4715-83A0-919D8B92F780}" type="slidenum">
               <a:rPr lang="en-ZA" smtClean="0"/>
+              <a:pPr/>
               <a:t>‹#›</a:t>
             </a:fld>
             <a:endParaRPr lang="en-ZA"/>
@@ -2829,7 +2853,7 @@
     </p:spTree>
     <p:extLst>
       <p:ext uri="{BB962C8B-B14F-4D97-AF65-F5344CB8AC3E}">
-        <p14:creationId xmlns:p14="http://schemas.microsoft.com/office/powerpoint/2010/main" val="2839475855"/>
+        <p14:creationId xmlns:p14="http://schemas.microsoft.com/office/powerpoint/2010/main" xmlns="" val="2839475855"/>
       </p:ext>
     </p:extLst>
   </p:cSld>
@@ -3177,7 +3201,7 @@
         <p:spPr>
           <a:xfrm>
             <a:off x="827584" y="2060848"/>
-            <a:ext cx="7560840" cy="4032448"/>
+            <a:ext cx="7706816" cy="4032448"/>
           </a:xfrm>
           <a:solidFill>
             <a:schemeClr val="tx1">
@@ -3283,7 +3307,7 @@
                   <a:schemeClr val="bg1"/>
                 </a:solidFill>
               </a:rPr>
-              <a:t>	12247040 - </a:t>
+              <a:t>	</a:t>
             </a:r>
             <a:r>
               <a:rPr lang="en-ZA" dirty="0" smtClean="0">
@@ -3291,7 +3315,15 @@
                   <a:schemeClr val="bg1"/>
                 </a:solidFill>
               </a:rPr>
-              <a:t>Team Lead</a:t>
+              <a:t> 12247040 </a:t>
+            </a:r>
+            <a:r>
+              <a:rPr lang="en-ZA" dirty="0" smtClean="0">
+                <a:solidFill>
+                  <a:schemeClr val="bg1"/>
+                </a:solidFill>
+              </a:rPr>
+              <a:t>- Team Lead</a:t>
             </a:r>
           </a:p>
           <a:p>
@@ -3326,8 +3358,21 @@
                   <a:schemeClr val="bg1"/>
                 </a:solidFill>
               </a:rPr>
-              <a:t>	13049136</a:t>
-            </a:r>
+              <a:t>	</a:t>
+            </a:r>
+            <a:r>
+              <a:rPr lang="en-ZA" dirty="0" smtClean="0">
+                <a:solidFill>
+                  <a:schemeClr val="bg1"/>
+                </a:solidFill>
+              </a:rPr>
+              <a:t> 13049136</a:t>
+            </a:r>
+            <a:endParaRPr lang="en-ZA" dirty="0" smtClean="0">
+              <a:solidFill>
+                <a:schemeClr val="bg1"/>
+              </a:solidFill>
+            </a:endParaRPr>
           </a:p>
           <a:p>
             <a:pPr algn="l"/>
@@ -3361,67 +3406,85 @@
                   <a:schemeClr val="bg1"/>
                 </a:solidFill>
               </a:rPr>
+              <a:t> </a:t>
+            </a:r>
+            <a:r>
+              <a:rPr lang="en-ZA" dirty="0" smtClean="0">
+                <a:solidFill>
+                  <a:schemeClr val="bg1"/>
+                </a:solidFill>
+              </a:rPr>
+              <a:t>12167844 </a:t>
+            </a:r>
+            <a:endParaRPr lang="en-ZA" dirty="0" smtClean="0">
+              <a:solidFill>
+                <a:schemeClr val="bg1"/>
+              </a:solidFill>
+            </a:endParaRPr>
+          </a:p>
+          <a:p>
+            <a:pPr algn="l"/>
+            <a:r>
+              <a:rPr lang="en-ZA" dirty="0">
+                <a:solidFill>
+                  <a:schemeClr val="bg1"/>
+                </a:solidFill>
+              </a:rPr>
               <a:t>	</a:t>
             </a:r>
             <a:r>
+              <a:rPr lang="en-ZA" dirty="0" err="1" smtClean="0">
+                <a:solidFill>
+                  <a:schemeClr val="bg1"/>
+                </a:solidFill>
+              </a:rPr>
+              <a:t>Kaleab</a:t>
+            </a:r>
+            <a:r>
               <a:rPr lang="en-ZA" dirty="0" smtClean="0">
                 <a:solidFill>
                   <a:schemeClr val="bg1"/>
                 </a:solidFill>
               </a:rPr>
-              <a:t>12167844 </a:t>
-            </a:r>
-          </a:p>
-          <a:p>
-            <a:pPr algn="l"/>
+              <a:t> </a:t>
+            </a:r>
+            <a:r>
+              <a:rPr lang="en-ZA" dirty="0" err="1">
+                <a:solidFill>
+                  <a:schemeClr val="bg1"/>
+                </a:solidFill>
+              </a:rPr>
+              <a:t>Tessera</a:t>
+            </a:r>
             <a:r>
               <a:rPr lang="en-ZA" dirty="0">
                 <a:solidFill>
                   <a:schemeClr val="bg1"/>
                 </a:solidFill>
               </a:rPr>
-              <a:t>	 </a:t>
-            </a:r>
-            <a:r>
-              <a:rPr lang="en-ZA" dirty="0" err="1">
-                <a:solidFill>
-                  <a:schemeClr val="bg1"/>
-                </a:solidFill>
-              </a:rPr>
-              <a:t>Kaleab</a:t>
-            </a:r>
-            <a:r>
-              <a:rPr lang="en-ZA" dirty="0">
-                <a:solidFill>
-                  <a:schemeClr val="bg1"/>
-                </a:solidFill>
-              </a:rPr>
               <a:t> </a:t>
             </a:r>
             <a:r>
-              <a:rPr lang="en-ZA" dirty="0" err="1">
-                <a:solidFill>
-                  <a:schemeClr val="bg1"/>
-                </a:solidFill>
-              </a:rPr>
-              <a:t>Tessera</a:t>
-            </a:r>
-            <a:r>
-              <a:rPr lang="en-ZA" dirty="0">
-                <a:solidFill>
-                  <a:schemeClr val="bg1"/>
-                </a:solidFill>
-              </a:rPr>
-              <a:t> </a:t>
-            </a:r>
-            <a:r>
               <a:rPr lang="en-ZA" dirty="0" smtClean="0">
                 <a:solidFill>
                   <a:schemeClr val="bg1"/>
                 </a:solidFill>
               </a:rPr>
-              <a:t>	13048423</a:t>
-            </a:r>
+              <a:t>	</a:t>
+            </a:r>
+            <a:r>
+              <a:rPr lang="en-ZA" dirty="0" smtClean="0">
+                <a:solidFill>
+                  <a:schemeClr val="bg1"/>
+                </a:solidFill>
+              </a:rPr>
+              <a:t> 13048423</a:t>
+            </a:r>
+            <a:endParaRPr lang="en-ZA" dirty="0" smtClean="0">
+              <a:solidFill>
+                <a:schemeClr val="bg1"/>
+              </a:solidFill>
+            </a:endParaRPr>
           </a:p>
           <a:p>
             <a:pPr algn="l"/>
@@ -3444,7 +3507,7 @@
     </p:spTree>
     <p:extLst>
       <p:ext uri="{BB962C8B-B14F-4D97-AF65-F5344CB8AC3E}">
-        <p14:creationId xmlns:p14="http://schemas.microsoft.com/office/powerpoint/2010/main" val="308255282"/>
+        <p14:creationId xmlns:p14="http://schemas.microsoft.com/office/powerpoint/2010/main" xmlns="" val="308255282"/>
       </p:ext>
     </p:extLst>
   </p:cSld>
@@ -3523,7 +3586,7 @@
     </p:spTree>
     <p:extLst>
       <p:ext uri="{BB962C8B-B14F-4D97-AF65-F5344CB8AC3E}">
-        <p14:creationId xmlns:p14="http://schemas.microsoft.com/office/powerpoint/2010/main" val="2854353392"/>
+        <p14:creationId xmlns:p14="http://schemas.microsoft.com/office/powerpoint/2010/main" xmlns="" val="2854353392"/>
       </p:ext>
     </p:extLst>
   </p:cSld>
@@ -4072,15 +4135,7 @@
                   <a:schemeClr val="bg1"/>
                 </a:solidFill>
               </a:rPr>
-              <a:t>How challenges were overcome</a:t>
-            </a:r>
-            <a:r>
-              <a:rPr lang="en-ZA" sz="2000" b="1" dirty="0" smtClean="0">
-                <a:solidFill>
-                  <a:schemeClr val="bg1"/>
-                </a:solidFill>
-              </a:rPr>
-              <a:t>: </a:t>
+              <a:t>How challenges were overcome: </a:t>
             </a:r>
           </a:p>
           <a:p>
@@ -4148,7 +4203,7 @@
     </p:spTree>
     <p:extLst>
       <p:ext uri="{BB962C8B-B14F-4D97-AF65-F5344CB8AC3E}">
-        <p14:creationId xmlns:p14="http://schemas.microsoft.com/office/powerpoint/2010/main" val="4160446826"/>
+        <p14:creationId xmlns:p14="http://schemas.microsoft.com/office/powerpoint/2010/main" xmlns="" val="4160446826"/>
       </p:ext>
     </p:extLst>
   </p:cSld>
@@ -4235,7 +4290,7 @@
     </p:spTree>
     <p:extLst>
       <p:ext uri="{BB962C8B-B14F-4D97-AF65-F5344CB8AC3E}">
-        <p14:creationId xmlns:p14="http://schemas.microsoft.com/office/powerpoint/2010/main" val="1691782833"/>
+        <p14:creationId xmlns:p14="http://schemas.microsoft.com/office/powerpoint/2010/main" xmlns="" val="1691782833"/>
       </p:ext>
     </p:extLst>
   </p:cSld>
@@ -4729,15 +4784,7 @@
                   <a:schemeClr val="bg1"/>
                 </a:solidFill>
               </a:rPr>
-              <a:t>How challenges were overcome</a:t>
-            </a:r>
-            <a:r>
-              <a:rPr lang="en-ZA" sz="2000" b="1" dirty="0" smtClean="0">
-                <a:solidFill>
-                  <a:schemeClr val="bg1"/>
-                </a:solidFill>
-              </a:rPr>
-              <a:t>: </a:t>
+              <a:t>How challenges were overcome: </a:t>
             </a:r>
           </a:p>
           <a:p>
@@ -4805,7 +4852,7 @@
     </p:spTree>
     <p:extLst>
       <p:ext uri="{BB962C8B-B14F-4D97-AF65-F5344CB8AC3E}">
-        <p14:creationId xmlns:p14="http://schemas.microsoft.com/office/powerpoint/2010/main" val="109087637"/>
+        <p14:creationId xmlns:p14="http://schemas.microsoft.com/office/powerpoint/2010/main" xmlns="" val="109087637"/>
       </p:ext>
     </p:extLst>
   </p:cSld>
@@ -4884,7 +4931,7 @@
     </p:spTree>
     <p:extLst>
       <p:ext uri="{BB962C8B-B14F-4D97-AF65-F5344CB8AC3E}">
-        <p14:creationId xmlns:p14="http://schemas.microsoft.com/office/powerpoint/2010/main" val="3333079403"/>
+        <p14:creationId xmlns:p14="http://schemas.microsoft.com/office/powerpoint/2010/main" xmlns="" val="3333079403"/>
       </p:ext>
     </p:extLst>
   </p:cSld>
@@ -5015,7 +5062,7 @@
     </p:spTree>
     <p:extLst>
       <p:ext uri="{BB962C8B-B14F-4D97-AF65-F5344CB8AC3E}">
-        <p14:creationId xmlns:p14="http://schemas.microsoft.com/office/powerpoint/2010/main" val="2165796761"/>
+        <p14:creationId xmlns:p14="http://schemas.microsoft.com/office/powerpoint/2010/main" xmlns="" val="2165796761"/>
       </p:ext>
     </p:extLst>
   </p:cSld>
@@ -5643,15 +5690,7 @@
                   <a:schemeClr val="bg1"/>
                 </a:solidFill>
               </a:rPr>
-              <a:t>How challenges were overcome</a:t>
-            </a:r>
-            <a:r>
-              <a:rPr lang="en-ZA" sz="2200" b="1" dirty="0" smtClean="0">
-                <a:solidFill>
-                  <a:schemeClr val="bg1"/>
-                </a:solidFill>
-              </a:rPr>
-              <a:t>: </a:t>
+              <a:t>How challenges were overcome: </a:t>
             </a:r>
           </a:p>
           <a:p>
@@ -5773,7 +5812,7 @@
     </p:spTree>
     <p:extLst>
       <p:ext uri="{BB962C8B-B14F-4D97-AF65-F5344CB8AC3E}">
-        <p14:creationId xmlns:p14="http://schemas.microsoft.com/office/powerpoint/2010/main" val="3871235512"/>
+        <p14:creationId xmlns:p14="http://schemas.microsoft.com/office/powerpoint/2010/main" xmlns="" val="3871235512"/>
       </p:ext>
     </p:extLst>
   </p:cSld>
@@ -5852,7 +5891,7 @@
     </p:spTree>
     <p:extLst>
       <p:ext uri="{BB962C8B-B14F-4D97-AF65-F5344CB8AC3E}">
-        <p14:creationId xmlns:p14="http://schemas.microsoft.com/office/powerpoint/2010/main" val="2631370394"/>
+        <p14:creationId xmlns:p14="http://schemas.microsoft.com/office/powerpoint/2010/main" xmlns="" val="2631370394"/>
       </p:ext>
     </p:extLst>
   </p:cSld>
@@ -6346,15 +6385,7 @@
                   <a:schemeClr val="bg1"/>
                 </a:solidFill>
               </a:rPr>
-              <a:t>How challenges were overcome</a:t>
-            </a:r>
-            <a:r>
-              <a:rPr lang="en-ZA" sz="2000" b="1" dirty="0" smtClean="0">
-                <a:solidFill>
-                  <a:schemeClr val="bg1"/>
-                </a:solidFill>
-              </a:rPr>
-              <a:t>: </a:t>
+              <a:t>How challenges were overcome: </a:t>
             </a:r>
           </a:p>
           <a:p>
@@ -6422,7 +6453,7 @@
     </p:spTree>
     <p:extLst>
       <p:ext uri="{BB962C8B-B14F-4D97-AF65-F5344CB8AC3E}">
-        <p14:creationId xmlns:p14="http://schemas.microsoft.com/office/powerpoint/2010/main" val="3329563870"/>
+        <p14:creationId xmlns:p14="http://schemas.microsoft.com/office/powerpoint/2010/main" xmlns="" val="3329563870"/>
       </p:ext>
     </p:extLst>
   </p:cSld>
@@ -6501,7 +6532,7 @@
     </p:spTree>
     <p:extLst>
       <p:ext uri="{BB962C8B-B14F-4D97-AF65-F5344CB8AC3E}">
-        <p14:creationId xmlns:p14="http://schemas.microsoft.com/office/powerpoint/2010/main" val="149508204"/>
+        <p14:creationId xmlns:p14="http://schemas.microsoft.com/office/powerpoint/2010/main" xmlns="" val="149508204"/>
       </p:ext>
     </p:extLst>
   </p:cSld>
@@ -6995,15 +7026,7 @@
                   <a:schemeClr val="bg1"/>
                 </a:solidFill>
               </a:rPr>
-              <a:t>How challenges were overcome</a:t>
-            </a:r>
-            <a:r>
-              <a:rPr lang="en-ZA" sz="2000" b="1" dirty="0" smtClean="0">
-                <a:solidFill>
-                  <a:schemeClr val="bg1"/>
-                </a:solidFill>
-              </a:rPr>
-              <a:t>: </a:t>
+              <a:t>How challenges were overcome: </a:t>
             </a:r>
           </a:p>
           <a:p>
@@ -7071,7 +7094,7 @@
     </p:spTree>
     <p:extLst>
       <p:ext uri="{BB962C8B-B14F-4D97-AF65-F5344CB8AC3E}">
-        <p14:creationId xmlns:p14="http://schemas.microsoft.com/office/powerpoint/2010/main" val="446071776"/>
+        <p14:creationId xmlns:p14="http://schemas.microsoft.com/office/powerpoint/2010/main" xmlns="" val="446071776"/>
       </p:ext>
     </p:extLst>
   </p:cSld>
@@ -7150,7 +7173,7 @@
     </p:spTree>
     <p:extLst>
       <p:ext uri="{BB962C8B-B14F-4D97-AF65-F5344CB8AC3E}">
-        <p14:creationId xmlns:p14="http://schemas.microsoft.com/office/powerpoint/2010/main" val="2854353392"/>
+        <p14:creationId xmlns:p14="http://schemas.microsoft.com/office/powerpoint/2010/main" xmlns="" val="2854353392"/>
       </p:ext>
     </p:extLst>
   </p:cSld>
@@ -7644,15 +7667,7 @@
                   <a:schemeClr val="bg1"/>
                 </a:solidFill>
               </a:rPr>
-              <a:t>How challenges were overcome</a:t>
-            </a:r>
-            <a:r>
-              <a:rPr lang="en-ZA" sz="2000" b="1" dirty="0" smtClean="0">
-                <a:solidFill>
-                  <a:schemeClr val="bg1"/>
-                </a:solidFill>
-              </a:rPr>
-              <a:t>: </a:t>
+              <a:t>How challenges were overcome: </a:t>
             </a:r>
           </a:p>
           <a:p>
@@ -7720,7 +7735,7 @@
     </p:spTree>
     <p:extLst>
       <p:ext uri="{BB962C8B-B14F-4D97-AF65-F5344CB8AC3E}">
-        <p14:creationId xmlns:p14="http://schemas.microsoft.com/office/powerpoint/2010/main" val="446071776"/>
+        <p14:creationId xmlns:p14="http://schemas.microsoft.com/office/powerpoint/2010/main" xmlns="" val="446071776"/>
       </p:ext>
     </p:extLst>
   </p:cSld>

</xml_diff>

<commit_message>
Last changes for tonight
</commit_message>
<xml_diff>
--- a/Authentication - B.pptx
+++ b/Authentication - B.pptx
@@ -296,7 +296,8 @@
           <a:p>
             <a:fld id="{BC8B1206-7415-4CAA-BABF-4B2FCC8828A3}" type="datetimeFigureOut">
               <a:rPr lang="en-ZA" smtClean="0"/>
-              <a:t>2015-04-16</a:t>
+              <a:pPr/>
+              <a:t>2015/04/16</a:t>
             </a:fld>
             <a:endParaRPr lang="en-ZA"/>
           </a:p>
@@ -338,6 +339,7 @@
           <a:p>
             <a:fld id="{FF1E2881-C859-4715-83A0-919D8B92F780}" type="slidenum">
               <a:rPr lang="en-ZA" smtClean="0"/>
+              <a:pPr/>
               <a:t>‹#›</a:t>
             </a:fld>
             <a:endParaRPr lang="en-ZA"/>
@@ -347,7 +349,7 @@
     </p:spTree>
     <p:extLst>
       <p:ext uri="{BB962C8B-B14F-4D97-AF65-F5344CB8AC3E}">
-        <p14:creationId xmlns:p14="http://schemas.microsoft.com/office/powerpoint/2010/main" val="32494294"/>
+        <p14:creationId xmlns:p14="http://schemas.microsoft.com/office/powerpoint/2010/main" xmlns="" val="32494294"/>
       </p:ext>
     </p:extLst>
   </p:cSld>
@@ -466,7 +468,8 @@
           <a:p>
             <a:fld id="{BC8B1206-7415-4CAA-BABF-4B2FCC8828A3}" type="datetimeFigureOut">
               <a:rPr lang="en-ZA" smtClean="0"/>
-              <a:t>2015-04-16</a:t>
+              <a:pPr/>
+              <a:t>2015/04/16</a:t>
             </a:fld>
             <a:endParaRPr lang="en-ZA"/>
           </a:p>
@@ -508,6 +511,7 @@
           <a:p>
             <a:fld id="{FF1E2881-C859-4715-83A0-919D8B92F780}" type="slidenum">
               <a:rPr lang="en-ZA" smtClean="0"/>
+              <a:pPr/>
               <a:t>‹#›</a:t>
             </a:fld>
             <a:endParaRPr lang="en-ZA"/>
@@ -517,7 +521,7 @@
     </p:spTree>
     <p:extLst>
       <p:ext uri="{BB962C8B-B14F-4D97-AF65-F5344CB8AC3E}">
-        <p14:creationId xmlns:p14="http://schemas.microsoft.com/office/powerpoint/2010/main" val="1407415046"/>
+        <p14:creationId xmlns:p14="http://schemas.microsoft.com/office/powerpoint/2010/main" xmlns="" val="1407415046"/>
       </p:ext>
     </p:extLst>
   </p:cSld>
@@ -646,7 +650,8 @@
           <a:p>
             <a:fld id="{BC8B1206-7415-4CAA-BABF-4B2FCC8828A3}" type="datetimeFigureOut">
               <a:rPr lang="en-ZA" smtClean="0"/>
-              <a:t>2015-04-16</a:t>
+              <a:pPr/>
+              <a:t>2015/04/16</a:t>
             </a:fld>
             <a:endParaRPr lang="en-ZA"/>
           </a:p>
@@ -688,6 +693,7 @@
           <a:p>
             <a:fld id="{FF1E2881-C859-4715-83A0-919D8B92F780}" type="slidenum">
               <a:rPr lang="en-ZA" smtClean="0"/>
+              <a:pPr/>
               <a:t>‹#›</a:t>
             </a:fld>
             <a:endParaRPr lang="en-ZA"/>
@@ -697,7 +703,7 @@
     </p:spTree>
     <p:extLst>
       <p:ext uri="{BB962C8B-B14F-4D97-AF65-F5344CB8AC3E}">
-        <p14:creationId xmlns:p14="http://schemas.microsoft.com/office/powerpoint/2010/main" val="3489674815"/>
+        <p14:creationId xmlns:p14="http://schemas.microsoft.com/office/powerpoint/2010/main" xmlns="" val="3489674815"/>
       </p:ext>
     </p:extLst>
   </p:cSld>
@@ -816,7 +822,8 @@
           <a:p>
             <a:fld id="{BC8B1206-7415-4CAA-BABF-4B2FCC8828A3}" type="datetimeFigureOut">
               <a:rPr lang="en-ZA" smtClean="0"/>
-              <a:t>2015-04-16</a:t>
+              <a:pPr/>
+              <a:t>2015/04/16</a:t>
             </a:fld>
             <a:endParaRPr lang="en-ZA"/>
           </a:p>
@@ -858,6 +865,7 @@
           <a:p>
             <a:fld id="{FF1E2881-C859-4715-83A0-919D8B92F780}" type="slidenum">
               <a:rPr lang="en-ZA" smtClean="0"/>
+              <a:pPr/>
               <a:t>‹#›</a:t>
             </a:fld>
             <a:endParaRPr lang="en-ZA"/>
@@ -867,7 +875,7 @@
     </p:spTree>
     <p:extLst>
       <p:ext uri="{BB962C8B-B14F-4D97-AF65-F5344CB8AC3E}">
-        <p14:creationId xmlns:p14="http://schemas.microsoft.com/office/powerpoint/2010/main" val="3922563659"/>
+        <p14:creationId xmlns:p14="http://schemas.microsoft.com/office/powerpoint/2010/main" xmlns="" val="3922563659"/>
       </p:ext>
     </p:extLst>
   </p:cSld>
@@ -1062,7 +1070,8 @@
           <a:p>
             <a:fld id="{BC8B1206-7415-4CAA-BABF-4B2FCC8828A3}" type="datetimeFigureOut">
               <a:rPr lang="en-ZA" smtClean="0"/>
-              <a:t>2015-04-16</a:t>
+              <a:pPr/>
+              <a:t>2015/04/16</a:t>
             </a:fld>
             <a:endParaRPr lang="en-ZA"/>
           </a:p>
@@ -1104,6 +1113,7 @@
           <a:p>
             <a:fld id="{FF1E2881-C859-4715-83A0-919D8B92F780}" type="slidenum">
               <a:rPr lang="en-ZA" smtClean="0"/>
+              <a:pPr/>
               <a:t>‹#›</a:t>
             </a:fld>
             <a:endParaRPr lang="en-ZA"/>
@@ -1113,7 +1123,7 @@
     </p:spTree>
     <p:extLst>
       <p:ext uri="{BB962C8B-B14F-4D97-AF65-F5344CB8AC3E}">
-        <p14:creationId xmlns:p14="http://schemas.microsoft.com/office/powerpoint/2010/main" val="2839950182"/>
+        <p14:creationId xmlns:p14="http://schemas.microsoft.com/office/powerpoint/2010/main" xmlns="" val="2839950182"/>
       </p:ext>
     </p:extLst>
   </p:cSld>
@@ -1350,7 +1360,8 @@
           <a:p>
             <a:fld id="{BC8B1206-7415-4CAA-BABF-4B2FCC8828A3}" type="datetimeFigureOut">
               <a:rPr lang="en-ZA" smtClean="0"/>
-              <a:t>2015-04-16</a:t>
+              <a:pPr/>
+              <a:t>2015/04/16</a:t>
             </a:fld>
             <a:endParaRPr lang="en-ZA"/>
           </a:p>
@@ -1392,6 +1403,7 @@
           <a:p>
             <a:fld id="{FF1E2881-C859-4715-83A0-919D8B92F780}" type="slidenum">
               <a:rPr lang="en-ZA" smtClean="0"/>
+              <a:pPr/>
               <a:t>‹#›</a:t>
             </a:fld>
             <a:endParaRPr lang="en-ZA"/>
@@ -1401,7 +1413,7 @@
     </p:spTree>
     <p:extLst>
       <p:ext uri="{BB962C8B-B14F-4D97-AF65-F5344CB8AC3E}">
-        <p14:creationId xmlns:p14="http://schemas.microsoft.com/office/powerpoint/2010/main" val="3287254344"/>
+        <p14:creationId xmlns:p14="http://schemas.microsoft.com/office/powerpoint/2010/main" xmlns="" val="3287254344"/>
       </p:ext>
     </p:extLst>
   </p:cSld>
@@ -1772,7 +1784,8 @@
           <a:p>
             <a:fld id="{BC8B1206-7415-4CAA-BABF-4B2FCC8828A3}" type="datetimeFigureOut">
               <a:rPr lang="en-ZA" smtClean="0"/>
-              <a:t>2015-04-16</a:t>
+              <a:pPr/>
+              <a:t>2015/04/16</a:t>
             </a:fld>
             <a:endParaRPr lang="en-ZA"/>
           </a:p>
@@ -1814,6 +1827,7 @@
           <a:p>
             <a:fld id="{FF1E2881-C859-4715-83A0-919D8B92F780}" type="slidenum">
               <a:rPr lang="en-ZA" smtClean="0"/>
+              <a:pPr/>
               <a:t>‹#›</a:t>
             </a:fld>
             <a:endParaRPr lang="en-ZA"/>
@@ -1823,7 +1837,7 @@
     </p:spTree>
     <p:extLst>
       <p:ext uri="{BB962C8B-B14F-4D97-AF65-F5344CB8AC3E}">
-        <p14:creationId xmlns:p14="http://schemas.microsoft.com/office/powerpoint/2010/main" val="2992548387"/>
+        <p14:creationId xmlns:p14="http://schemas.microsoft.com/office/powerpoint/2010/main" xmlns="" val="2992548387"/>
       </p:ext>
     </p:extLst>
   </p:cSld>
@@ -1890,7 +1904,8 @@
           <a:p>
             <a:fld id="{BC8B1206-7415-4CAA-BABF-4B2FCC8828A3}" type="datetimeFigureOut">
               <a:rPr lang="en-ZA" smtClean="0"/>
-              <a:t>2015-04-16</a:t>
+              <a:pPr/>
+              <a:t>2015/04/16</a:t>
             </a:fld>
             <a:endParaRPr lang="en-ZA"/>
           </a:p>
@@ -1932,6 +1947,7 @@
           <a:p>
             <a:fld id="{FF1E2881-C859-4715-83A0-919D8B92F780}" type="slidenum">
               <a:rPr lang="en-ZA" smtClean="0"/>
+              <a:pPr/>
               <a:t>‹#›</a:t>
             </a:fld>
             <a:endParaRPr lang="en-ZA"/>
@@ -1941,7 +1957,7 @@
     </p:spTree>
     <p:extLst>
       <p:ext uri="{BB962C8B-B14F-4D97-AF65-F5344CB8AC3E}">
-        <p14:creationId xmlns:p14="http://schemas.microsoft.com/office/powerpoint/2010/main" val="4081995342"/>
+        <p14:creationId xmlns:p14="http://schemas.microsoft.com/office/powerpoint/2010/main" xmlns="" val="4081995342"/>
       </p:ext>
     </p:extLst>
   </p:cSld>
@@ -1985,7 +2001,8 @@
           <a:p>
             <a:fld id="{BC8B1206-7415-4CAA-BABF-4B2FCC8828A3}" type="datetimeFigureOut">
               <a:rPr lang="en-ZA" smtClean="0"/>
-              <a:t>2015-04-16</a:t>
+              <a:pPr/>
+              <a:t>2015/04/16</a:t>
             </a:fld>
             <a:endParaRPr lang="en-ZA"/>
           </a:p>
@@ -2027,6 +2044,7 @@
           <a:p>
             <a:fld id="{FF1E2881-C859-4715-83A0-919D8B92F780}" type="slidenum">
               <a:rPr lang="en-ZA" smtClean="0"/>
+              <a:pPr/>
               <a:t>‹#›</a:t>
             </a:fld>
             <a:endParaRPr lang="en-ZA"/>
@@ -2036,7 +2054,7 @@
     </p:spTree>
     <p:extLst>
       <p:ext uri="{BB962C8B-B14F-4D97-AF65-F5344CB8AC3E}">
-        <p14:creationId xmlns:p14="http://schemas.microsoft.com/office/powerpoint/2010/main" val="1897818696"/>
+        <p14:creationId xmlns:p14="http://schemas.microsoft.com/office/powerpoint/2010/main" xmlns="" val="1897818696"/>
       </p:ext>
     </p:extLst>
   </p:cSld>
@@ -2262,7 +2280,8 @@
           <a:p>
             <a:fld id="{BC8B1206-7415-4CAA-BABF-4B2FCC8828A3}" type="datetimeFigureOut">
               <a:rPr lang="en-ZA" smtClean="0"/>
-              <a:t>2015-04-16</a:t>
+              <a:pPr/>
+              <a:t>2015/04/16</a:t>
             </a:fld>
             <a:endParaRPr lang="en-ZA"/>
           </a:p>
@@ -2304,6 +2323,7 @@
           <a:p>
             <a:fld id="{FF1E2881-C859-4715-83A0-919D8B92F780}" type="slidenum">
               <a:rPr lang="en-ZA" smtClean="0"/>
+              <a:pPr/>
               <a:t>‹#›</a:t>
             </a:fld>
             <a:endParaRPr lang="en-ZA"/>
@@ -2313,7 +2333,7 @@
     </p:spTree>
     <p:extLst>
       <p:ext uri="{BB962C8B-B14F-4D97-AF65-F5344CB8AC3E}">
-        <p14:creationId xmlns:p14="http://schemas.microsoft.com/office/powerpoint/2010/main" val="2349542582"/>
+        <p14:creationId xmlns:p14="http://schemas.microsoft.com/office/powerpoint/2010/main" xmlns="" val="2349542582"/>
       </p:ext>
     </p:extLst>
   </p:cSld>
@@ -2515,7 +2535,8 @@
           <a:p>
             <a:fld id="{BC8B1206-7415-4CAA-BABF-4B2FCC8828A3}" type="datetimeFigureOut">
               <a:rPr lang="en-ZA" smtClean="0"/>
-              <a:t>2015-04-16</a:t>
+              <a:pPr/>
+              <a:t>2015/04/16</a:t>
             </a:fld>
             <a:endParaRPr lang="en-ZA"/>
           </a:p>
@@ -2557,6 +2578,7 @@
           <a:p>
             <a:fld id="{FF1E2881-C859-4715-83A0-919D8B92F780}" type="slidenum">
               <a:rPr lang="en-ZA" smtClean="0"/>
+              <a:pPr/>
               <a:t>‹#›</a:t>
             </a:fld>
             <a:endParaRPr lang="en-ZA"/>
@@ -2566,7 +2588,7 @@
     </p:spTree>
     <p:extLst>
       <p:ext uri="{BB962C8B-B14F-4D97-AF65-F5344CB8AC3E}">
-        <p14:creationId xmlns:p14="http://schemas.microsoft.com/office/powerpoint/2010/main" val="1781508516"/>
+        <p14:creationId xmlns:p14="http://schemas.microsoft.com/office/powerpoint/2010/main" xmlns="" val="1781508516"/>
       </p:ext>
     </p:extLst>
   </p:cSld>
@@ -2737,7 +2759,8 @@
           <a:p>
             <a:fld id="{BC8B1206-7415-4CAA-BABF-4B2FCC8828A3}" type="datetimeFigureOut">
               <a:rPr lang="en-ZA" smtClean="0"/>
-              <a:t>2015-04-16</a:t>
+              <a:pPr/>
+              <a:t>2015/04/16</a:t>
             </a:fld>
             <a:endParaRPr lang="en-ZA"/>
           </a:p>
@@ -2815,6 +2838,7 @@
           <a:p>
             <a:fld id="{FF1E2881-C859-4715-83A0-919D8B92F780}" type="slidenum">
               <a:rPr lang="en-ZA" smtClean="0"/>
+              <a:pPr/>
               <a:t>‹#›</a:t>
             </a:fld>
             <a:endParaRPr lang="en-ZA"/>
@@ -2824,7 +2848,7 @@
     </p:spTree>
     <p:extLst>
       <p:ext uri="{BB962C8B-B14F-4D97-AF65-F5344CB8AC3E}">
-        <p14:creationId xmlns:p14="http://schemas.microsoft.com/office/powerpoint/2010/main" val="2839475855"/>
+        <p14:creationId xmlns:p14="http://schemas.microsoft.com/office/powerpoint/2010/main" xmlns="" val="2839475855"/>
       </p:ext>
     </p:extLst>
   </p:cSld>
@@ -3172,7 +3196,7 @@
         <p:spPr>
           <a:xfrm>
             <a:off x="827584" y="2060848"/>
-            <a:ext cx="7560840" cy="4032448"/>
+            <a:ext cx="7935416" cy="4032448"/>
           </a:xfrm>
           <a:solidFill>
             <a:schemeClr val="tx1">
@@ -3278,7 +3302,23 @@
                   <a:schemeClr val="bg1"/>
                 </a:solidFill>
               </a:rPr>
-              <a:t>	12247040 - Team Lead</a:t>
+              <a:t>	</a:t>
+            </a:r>
+            <a:r>
+              <a:rPr lang="en-ZA" dirty="0" smtClean="0">
+                <a:solidFill>
+                  <a:schemeClr val="bg1"/>
+                </a:solidFill>
+              </a:rPr>
+              <a:t> 12247040 </a:t>
+            </a:r>
+            <a:r>
+              <a:rPr lang="en-ZA" dirty="0" smtClean="0">
+                <a:solidFill>
+                  <a:schemeClr val="bg1"/>
+                </a:solidFill>
+              </a:rPr>
+              <a:t>- Team Lead</a:t>
             </a:r>
           </a:p>
           <a:p>
@@ -3313,8 +3353,21 @@
                   <a:schemeClr val="bg1"/>
                 </a:solidFill>
               </a:rPr>
-              <a:t>	13049136</a:t>
-            </a:r>
+              <a:t>	</a:t>
+            </a:r>
+            <a:r>
+              <a:rPr lang="en-ZA" dirty="0" smtClean="0">
+                <a:solidFill>
+                  <a:schemeClr val="bg1"/>
+                </a:solidFill>
+              </a:rPr>
+              <a:t> 13049136</a:t>
+            </a:r>
+            <a:endParaRPr lang="en-ZA" dirty="0" smtClean="0">
+              <a:solidFill>
+                <a:schemeClr val="bg1"/>
+              </a:solidFill>
+            </a:endParaRPr>
           </a:p>
           <a:p>
             <a:pPr algn="l"/>
@@ -3348,67 +3401,85 @@
                   <a:schemeClr val="bg1"/>
                 </a:solidFill>
               </a:rPr>
+              <a:t> </a:t>
+            </a:r>
+            <a:r>
+              <a:rPr lang="en-ZA" dirty="0" smtClean="0">
+                <a:solidFill>
+                  <a:schemeClr val="bg1"/>
+                </a:solidFill>
+              </a:rPr>
+              <a:t>12167844 </a:t>
+            </a:r>
+            <a:endParaRPr lang="en-ZA" dirty="0" smtClean="0">
+              <a:solidFill>
+                <a:schemeClr val="bg1"/>
+              </a:solidFill>
+            </a:endParaRPr>
+          </a:p>
+          <a:p>
+            <a:pPr algn="l"/>
+            <a:r>
+              <a:rPr lang="en-ZA" dirty="0">
+                <a:solidFill>
+                  <a:schemeClr val="bg1"/>
+                </a:solidFill>
+              </a:rPr>
               <a:t>	</a:t>
             </a:r>
             <a:r>
+              <a:rPr lang="en-ZA" dirty="0" err="1" smtClean="0">
+                <a:solidFill>
+                  <a:schemeClr val="bg1"/>
+                </a:solidFill>
+              </a:rPr>
+              <a:t>Kaleab</a:t>
+            </a:r>
+            <a:r>
               <a:rPr lang="en-ZA" dirty="0" smtClean="0">
                 <a:solidFill>
                   <a:schemeClr val="bg1"/>
                 </a:solidFill>
               </a:rPr>
-              <a:t>12167844 </a:t>
-            </a:r>
-          </a:p>
-          <a:p>
-            <a:pPr algn="l"/>
+              <a:t> </a:t>
+            </a:r>
+            <a:r>
+              <a:rPr lang="en-ZA" dirty="0" err="1">
+                <a:solidFill>
+                  <a:schemeClr val="bg1"/>
+                </a:solidFill>
+              </a:rPr>
+              <a:t>Tessera</a:t>
+            </a:r>
             <a:r>
               <a:rPr lang="en-ZA" dirty="0">
                 <a:solidFill>
                   <a:schemeClr val="bg1"/>
                 </a:solidFill>
               </a:rPr>
-              <a:t>	 </a:t>
-            </a:r>
-            <a:r>
-              <a:rPr lang="en-ZA" dirty="0" err="1">
-                <a:solidFill>
-                  <a:schemeClr val="bg1"/>
-                </a:solidFill>
-              </a:rPr>
-              <a:t>Kaleab</a:t>
-            </a:r>
-            <a:r>
-              <a:rPr lang="en-ZA" dirty="0">
-                <a:solidFill>
-                  <a:schemeClr val="bg1"/>
-                </a:solidFill>
-              </a:rPr>
               <a:t> </a:t>
             </a:r>
             <a:r>
-              <a:rPr lang="en-ZA" dirty="0" err="1">
-                <a:solidFill>
-                  <a:schemeClr val="bg1"/>
-                </a:solidFill>
-              </a:rPr>
-              <a:t>Tessera</a:t>
-            </a:r>
-            <a:r>
-              <a:rPr lang="en-ZA" dirty="0">
-                <a:solidFill>
-                  <a:schemeClr val="bg1"/>
-                </a:solidFill>
-              </a:rPr>
-              <a:t> </a:t>
-            </a:r>
-            <a:r>
               <a:rPr lang="en-ZA" dirty="0" smtClean="0">
                 <a:solidFill>
                   <a:schemeClr val="bg1"/>
                 </a:solidFill>
               </a:rPr>
-              <a:t>	13048423</a:t>
-            </a:r>
+              <a:t>	</a:t>
+            </a:r>
+            <a:r>
+              <a:rPr lang="en-ZA" dirty="0" smtClean="0">
+                <a:solidFill>
+                  <a:schemeClr val="bg1"/>
+                </a:solidFill>
+              </a:rPr>
+              <a:t> 13048423</a:t>
+            </a:r>
+            <a:endParaRPr lang="en-ZA" dirty="0" smtClean="0">
+              <a:solidFill>
+                <a:schemeClr val="bg1"/>
+              </a:solidFill>
+            </a:endParaRPr>
           </a:p>
           <a:p>
             <a:pPr algn="l"/>
@@ -3431,7 +3502,7 @@
     </p:spTree>
     <p:extLst>
       <p:ext uri="{BB962C8B-B14F-4D97-AF65-F5344CB8AC3E}">
-        <p14:creationId xmlns:p14="http://schemas.microsoft.com/office/powerpoint/2010/main" val="308255282"/>
+        <p14:creationId xmlns:p14="http://schemas.microsoft.com/office/powerpoint/2010/main" xmlns="" val="308255282"/>
       </p:ext>
     </p:extLst>
   </p:cSld>
@@ -3574,7 +3645,7 @@
     </p:spTree>
     <p:extLst>
       <p:ext uri="{BB962C8B-B14F-4D97-AF65-F5344CB8AC3E}">
-        <p14:creationId xmlns:p14="http://schemas.microsoft.com/office/powerpoint/2010/main" val="2165796761"/>
+        <p14:creationId xmlns:p14="http://schemas.microsoft.com/office/powerpoint/2010/main" xmlns="" val="2165796761"/>
       </p:ext>
     </p:extLst>
   </p:cSld>
@@ -4223,7 +4294,7 @@
     </p:spTree>
     <p:extLst>
       <p:ext uri="{BB962C8B-B14F-4D97-AF65-F5344CB8AC3E}">
-        <p14:creationId xmlns:p14="http://schemas.microsoft.com/office/powerpoint/2010/main" val="3871235512"/>
+        <p14:creationId xmlns:p14="http://schemas.microsoft.com/office/powerpoint/2010/main" xmlns="" val="3871235512"/>
       </p:ext>
     </p:extLst>
   </p:cSld>
@@ -4354,7 +4425,7 @@
         </p:spPr>
         <p:txBody>
           <a:bodyPr>
-            <a:normAutofit/>
+            <a:normAutofit lnSpcReduction="10000"/>
           </a:bodyPr>
           <a:lstStyle/>
           <a:p>
@@ -4382,7 +4453,7 @@
             <a:pPr marL="0" indent="0" algn="just">
               <a:buNone/>
             </a:pPr>
-            <a:endParaRPr lang="en-ZA" sz="2000" dirty="0">
+            <a:endParaRPr lang="en-ZA" sz="1000" dirty="0" smtClean="0">
               <a:solidFill>
                 <a:schemeClr val="bg1"/>
               </a:solidFill>
@@ -4392,7 +4463,55 @@
             <a:pPr marL="0" indent="0" algn="just">
               <a:buNone/>
             </a:pPr>
-            <a:endParaRPr lang="en-ZA" sz="2000" dirty="0" smtClean="0">
+            <a:r>
+              <a:rPr lang="en-ZA" sz="1800" dirty="0" smtClean="0">
+                <a:solidFill>
+                  <a:schemeClr val="bg1"/>
+                </a:solidFill>
+              </a:rPr>
+              <a:t>Adds a restriction to a certain </a:t>
+            </a:r>
+            <a:r>
+              <a:rPr lang="en-ZA" sz="1800" dirty="0" err="1" smtClean="0">
+                <a:solidFill>
+                  <a:schemeClr val="bg1"/>
+                </a:solidFill>
+              </a:rPr>
+              <a:t>buzzSpace</a:t>
+            </a:r>
+            <a:r>
+              <a:rPr lang="en-ZA" sz="1800" dirty="0" smtClean="0">
+                <a:solidFill>
+                  <a:schemeClr val="bg1"/>
+                </a:solidFill>
+              </a:rPr>
+              <a:t> </a:t>
+            </a:r>
+            <a:r>
+              <a:rPr lang="en-ZA" sz="1800" dirty="0" smtClean="0">
+                <a:solidFill>
+                  <a:schemeClr val="bg1"/>
+                </a:solidFill>
+              </a:rPr>
+              <a:t>for a specific service, based on a minimum role and minimum </a:t>
+            </a:r>
+            <a:r>
+              <a:rPr lang="en-ZA" sz="1800" dirty="0" err="1" smtClean="0">
+                <a:solidFill>
+                  <a:schemeClr val="bg1"/>
+                </a:solidFill>
+              </a:rPr>
+              <a:t>statuspoints</a:t>
+            </a:r>
+            <a:r>
+              <a:rPr lang="en-ZA" sz="1800" dirty="0" smtClean="0">
+                <a:solidFill>
+                  <a:schemeClr val="bg1"/>
+                </a:solidFill>
+              </a:rPr>
+              <a:t>, if the required conditions are met.</a:t>
+            </a:r>
+            <a:endParaRPr lang="en-ZA" sz="1800" dirty="0">
               <a:solidFill>
                 <a:schemeClr val="bg1"/>
               </a:solidFill>
@@ -4402,7 +4521,7 @@
             <a:pPr marL="0" indent="0" algn="just">
               <a:buNone/>
             </a:pPr>
-            <a:endParaRPr lang="en-ZA" sz="2000" dirty="0" smtClean="0">
+            <a:endParaRPr lang="en-ZA" sz="1000" dirty="0" smtClean="0">
               <a:solidFill>
                 <a:schemeClr val="bg1"/>
               </a:solidFill>
@@ -4418,14 +4537,22 @@
                   <a:schemeClr val="bg1"/>
                 </a:solidFill>
               </a:rPr>
-              <a:t>Pre and Post Conditions:</a:t>
+              <a:t>Pre and Post Conditions</a:t>
+            </a:r>
+            <a:r>
+              <a:rPr lang="en-ZA" sz="2000" b="1" dirty="0" smtClean="0">
+                <a:solidFill>
+                  <a:schemeClr val="bg1"/>
+                </a:solidFill>
+              </a:rPr>
+              <a:t>:</a:t>
             </a:r>
           </a:p>
           <a:p>
             <a:pPr marL="0" indent="0" algn="just">
               <a:buNone/>
             </a:pPr>
-            <a:endParaRPr lang="en-ZA" dirty="0">
+            <a:endParaRPr lang="en-ZA" sz="1000" b="1" dirty="0">
               <a:solidFill>
                 <a:schemeClr val="bg1"/>
               </a:solidFill>
@@ -4435,41 +4562,135 @@
             <a:pPr marL="0" indent="0" algn="just">
               <a:buNone/>
             </a:pPr>
-            <a:endParaRPr lang="en-ZA" dirty="0" smtClean="0">
-              <a:solidFill>
-                <a:schemeClr val="bg1"/>
-              </a:solidFill>
-            </a:endParaRPr>
-          </a:p>
-          <a:p>
-            <a:pPr marL="0" indent="0">
-              <a:buNone/>
-            </a:pPr>
-            <a:r>
-              <a:rPr lang="en-ZA" dirty="0" smtClean="0">
-                <a:solidFill>
-                  <a:schemeClr val="bg1"/>
-                </a:solidFill>
-              </a:rPr>
-              <a:t>	</a:t>
-            </a:r>
-          </a:p>
-          <a:p>
-            <a:endParaRPr lang="en-ZA" dirty="0" smtClean="0">
-              <a:solidFill>
-                <a:schemeClr val="bg1"/>
-              </a:solidFill>
-            </a:endParaRPr>
-          </a:p>
-          <a:p>
-            <a:endParaRPr lang="en-ZA" dirty="0">
-              <a:solidFill>
-                <a:schemeClr val="bg1"/>
-              </a:solidFill>
-            </a:endParaRPr>
-          </a:p>
-          <a:p>
-            <a:endParaRPr lang="en-ZA" dirty="0">
+            <a:r>
+              <a:rPr lang="en-ZA" sz="1800" dirty="0" smtClean="0">
+                <a:solidFill>
+                  <a:schemeClr val="bg1"/>
+                </a:solidFill>
+              </a:rPr>
+              <a:t>*Specific r</a:t>
+            </a:r>
+            <a:r>
+              <a:rPr lang="en-ZA" sz="1800" dirty="0" smtClean="0">
+                <a:solidFill>
+                  <a:schemeClr val="bg1"/>
+                </a:solidFill>
+              </a:rPr>
+              <a:t>estriction should not exist.</a:t>
+            </a:r>
+          </a:p>
+          <a:p>
+            <a:pPr marL="0" indent="0" algn="just">
+              <a:buNone/>
+            </a:pPr>
+            <a:r>
+              <a:rPr lang="en-ZA" sz="1800" dirty="0" smtClean="0">
+                <a:solidFill>
+                  <a:schemeClr val="bg1"/>
+                </a:solidFill>
+              </a:rPr>
+              <a:t>*Specified </a:t>
+            </a:r>
+            <a:r>
+              <a:rPr lang="en-ZA" sz="1800" dirty="0" err="1" smtClean="0">
+                <a:solidFill>
+                  <a:schemeClr val="bg1"/>
+                </a:solidFill>
+              </a:rPr>
+              <a:t>buzzSpace</a:t>
+            </a:r>
+            <a:r>
+              <a:rPr lang="en-ZA" sz="1800" dirty="0" smtClean="0">
+                <a:solidFill>
+                  <a:schemeClr val="bg1"/>
+                </a:solidFill>
+              </a:rPr>
+              <a:t> should Exist.</a:t>
+            </a:r>
+            <a:endParaRPr lang="en-ZA" sz="1800" dirty="0" smtClean="0">
+              <a:solidFill>
+                <a:schemeClr val="bg1"/>
+              </a:solidFill>
+            </a:endParaRPr>
+          </a:p>
+          <a:p>
+            <a:pPr marL="0" indent="0" algn="just">
+              <a:buNone/>
+            </a:pPr>
+            <a:r>
+              <a:rPr lang="en-ZA" sz="1800" dirty="0" smtClean="0">
+                <a:solidFill>
+                  <a:schemeClr val="bg1"/>
+                </a:solidFill>
+              </a:rPr>
+              <a:t>*Specified service should </a:t>
+            </a:r>
+            <a:r>
+              <a:rPr lang="en-ZA" sz="1800" dirty="0" smtClean="0">
+                <a:solidFill>
+                  <a:schemeClr val="bg1"/>
+                </a:solidFill>
+              </a:rPr>
+              <a:t>Exist</a:t>
+            </a:r>
+            <a:r>
+              <a:rPr lang="en-ZA" sz="1800" dirty="0" smtClean="0">
+                <a:solidFill>
+                  <a:schemeClr val="bg1"/>
+                </a:solidFill>
+              </a:rPr>
+              <a:t>.</a:t>
+            </a:r>
+          </a:p>
+          <a:p>
+            <a:pPr marL="0" indent="0" algn="just">
+              <a:buNone/>
+            </a:pPr>
+            <a:r>
+              <a:rPr lang="en-ZA" sz="1800" dirty="0" smtClean="0">
+                <a:solidFill>
+                  <a:schemeClr val="bg1"/>
+                </a:solidFill>
+              </a:rPr>
+              <a:t>*Specified role should be valid. </a:t>
+            </a:r>
+          </a:p>
+          <a:p>
+            <a:pPr marL="0" indent="0" algn="just">
+              <a:buNone/>
+            </a:pPr>
+            <a:r>
+              <a:rPr lang="en-ZA" sz="1800" dirty="0" smtClean="0">
+                <a:solidFill>
+                  <a:schemeClr val="bg1"/>
+                </a:solidFill>
+              </a:rPr>
+              <a:t>*Minimum Status points should be valid.</a:t>
+            </a:r>
+          </a:p>
+          <a:p>
+            <a:pPr marL="0" indent="0" algn="just">
+              <a:buNone/>
+            </a:pPr>
+            <a:endParaRPr lang="en-ZA" sz="1800" dirty="0" smtClean="0">
+              <a:solidFill>
+                <a:schemeClr val="bg1"/>
+              </a:solidFill>
+            </a:endParaRPr>
+          </a:p>
+          <a:p>
+            <a:pPr marL="0" indent="0" algn="just">
+              <a:buNone/>
+            </a:pPr>
+            <a:r>
+              <a:rPr lang="en-ZA" sz="1800" dirty="0" smtClean="0">
+                <a:solidFill>
+                  <a:schemeClr val="bg1"/>
+                </a:solidFill>
+              </a:rPr>
+              <a:t>#The new restriction document was added to the database.</a:t>
+            </a:r>
+            <a:endParaRPr lang="en-ZA" sz="1800" dirty="0">
               <a:solidFill>
                 <a:schemeClr val="bg1"/>
               </a:solidFill>
@@ -4488,7 +4709,7 @@
         <p:spPr>
           <a:xfrm>
             <a:off x="4788024" y="1628800"/>
-            <a:ext cx="4104456" cy="4680520"/>
+            <a:ext cx="4203576" cy="4680520"/>
           </a:xfrm>
           <a:prstGeom prst="rect">
             <a:avLst/>
@@ -4505,7 +4726,7 @@
         </p:spPr>
         <p:txBody>
           <a:bodyPr vert="horz" lIns="91440" tIns="45720" rIns="91440" bIns="45720" rtlCol="0">
-            <a:normAutofit/>
+            <a:normAutofit fontScale="77500" lnSpcReduction="20000"/>
           </a:bodyPr>
           <a:lstStyle>
             <a:lvl1pPr marL="342900" indent="-342900" algn="l" defTabSz="914400" rtl="0" eaLnBrk="1" latinLnBrk="0" hangingPunct="1">
@@ -4669,25 +4890,87 @@
                   <a:schemeClr val="bg1"/>
                 </a:solidFill>
               </a:rPr>
-              <a:t>…</a:t>
-            </a:r>
+              <a:t>Understanding how </a:t>
+            </a:r>
+            <a:r>
+              <a:rPr lang="en-ZA" sz="2000" dirty="0" smtClean="0">
+                <a:solidFill>
+                  <a:schemeClr val="bg1"/>
+                </a:solidFill>
+              </a:rPr>
+              <a:t>to use the new technologies/applications. Like </a:t>
+            </a:r>
+            <a:r>
+              <a:rPr lang="en-ZA" sz="2000" dirty="0" err="1" smtClean="0">
+                <a:solidFill>
+                  <a:schemeClr val="bg1"/>
+                </a:solidFill>
+              </a:rPr>
+              <a:t>MongoDB</a:t>
+            </a:r>
+            <a:r>
+              <a:rPr lang="en-ZA" sz="2000" dirty="0" smtClean="0">
+                <a:solidFill>
+                  <a:schemeClr val="bg1"/>
+                </a:solidFill>
+              </a:rPr>
+              <a:t> and Mongoose, as well as </a:t>
+            </a:r>
+            <a:r>
+              <a:rPr lang="en-ZA" sz="2000" dirty="0" err="1" smtClean="0">
+                <a:solidFill>
+                  <a:schemeClr val="bg1"/>
+                </a:solidFill>
+              </a:rPr>
+              <a:t>Javascript</a:t>
+            </a:r>
+            <a:r>
+              <a:rPr lang="en-ZA" sz="2000" dirty="0" smtClean="0">
+                <a:solidFill>
+                  <a:schemeClr val="bg1"/>
+                </a:solidFill>
+              </a:rPr>
+              <a:t> without using a browser.</a:t>
+            </a:r>
+            <a:endParaRPr lang="en-ZA" sz="2000" dirty="0">
+              <a:solidFill>
+                <a:schemeClr val="bg1"/>
+              </a:solidFill>
+            </a:endParaRPr>
           </a:p>
           <a:p>
             <a:pPr marL="514350" indent="-514350" algn="just">
               <a:buFont typeface="Arial" pitchFamily="34" charset="0"/>
               <a:buAutoNum type="arabicPeriod"/>
             </a:pPr>
-            <a:endParaRPr lang="en-ZA" sz="2000" dirty="0">
-              <a:solidFill>
-                <a:schemeClr val="bg1"/>
-              </a:solidFill>
-            </a:endParaRPr>
+            <a:r>
+              <a:rPr lang="en-ZA" sz="2000" dirty="0" smtClean="0">
+                <a:solidFill>
+                  <a:schemeClr val="bg1"/>
+                </a:solidFill>
+              </a:rPr>
+              <a:t>Struggling with work and calls being asynchronous.(Some code being overtaken because of asynchronous execution .)</a:t>
+            </a:r>
           </a:p>
           <a:p>
             <a:pPr marL="514350" indent="-514350" algn="just">
               <a:buFont typeface="Arial" pitchFamily="34" charset="0"/>
               <a:buAutoNum type="arabicPeriod"/>
             </a:pPr>
+            <a:r>
+              <a:rPr lang="en-ZA" sz="2000" dirty="0" smtClean="0">
+                <a:solidFill>
+                  <a:schemeClr val="bg1"/>
+                </a:solidFill>
+              </a:rPr>
+              <a:t>Waiting for other teams to do their work or give instructions to our team. For example top level giving the database schemas to us lower levels.</a:t>
+            </a:r>
+          </a:p>
+          <a:p>
+            <a:pPr marL="514350" indent="-514350" algn="just">
+              <a:buFont typeface="Arial" pitchFamily="34" charset="0"/>
+              <a:buAutoNum type="arabicPeriod"/>
+            </a:pPr>
             <a:endParaRPr lang="en-ZA" sz="2000" dirty="0">
               <a:solidFill>
                 <a:schemeClr val="bg1"/>
@@ -4718,49 +5001,65 @@
                   <a:schemeClr val="bg1"/>
                 </a:solidFill>
               </a:rPr>
-              <a:t>…</a:t>
-            </a:r>
-          </a:p>
-          <a:p>
-            <a:pPr marL="0" indent="0" algn="just">
-              <a:buFont typeface="Arial" pitchFamily="34" charset="0"/>
-              <a:buNone/>
-            </a:pPr>
-            <a:endParaRPr lang="en-ZA" dirty="0" smtClean="0">
-              <a:solidFill>
-                <a:schemeClr val="bg1"/>
-              </a:solidFill>
-            </a:endParaRPr>
-          </a:p>
-          <a:p>
-            <a:pPr marL="0" indent="0">
-              <a:buFont typeface="Arial" pitchFamily="34" charset="0"/>
-              <a:buNone/>
-            </a:pPr>
-            <a:r>
-              <a:rPr lang="en-ZA" dirty="0" smtClean="0">
-                <a:solidFill>
-                  <a:schemeClr val="bg1"/>
-                </a:solidFill>
-              </a:rPr>
-              <a:t>	</a:t>
-            </a:r>
-          </a:p>
-          <a:p>
-            <a:endParaRPr lang="en-ZA" dirty="0" smtClean="0">
-              <a:solidFill>
-                <a:schemeClr val="bg1"/>
-              </a:solidFill>
-            </a:endParaRPr>
-          </a:p>
-          <a:p>
-            <a:endParaRPr lang="en-ZA" dirty="0" smtClean="0">
-              <a:solidFill>
-                <a:schemeClr val="bg1"/>
-              </a:solidFill>
-            </a:endParaRPr>
-          </a:p>
-          <a:p>
+              <a:t>Doing research/asking team members.</a:t>
+            </a:r>
+          </a:p>
+          <a:p>
+            <a:pPr marL="514350" indent="-514350" algn="just">
+              <a:buFont typeface="+mj-lt"/>
+              <a:buAutoNum type="arabicPeriod"/>
+            </a:pPr>
+            <a:r>
+              <a:rPr lang="en-ZA" sz="2000" dirty="0" smtClean="0">
+                <a:solidFill>
+                  <a:schemeClr val="bg1"/>
+                </a:solidFill>
+              </a:rPr>
+              <a:t>Made use of a </a:t>
+            </a:r>
+            <a:r>
+              <a:rPr lang="en-ZA" sz="2000" dirty="0" err="1" smtClean="0">
+                <a:solidFill>
+                  <a:schemeClr val="bg1"/>
+                </a:solidFill>
+              </a:rPr>
+              <a:t>callback</a:t>
+            </a:r>
+            <a:r>
+              <a:rPr lang="en-ZA" sz="2000" dirty="0" smtClean="0">
+                <a:solidFill>
+                  <a:schemeClr val="bg1"/>
+                </a:solidFill>
+              </a:rPr>
+              <a:t> function/value. To ensure the correct </a:t>
+            </a:r>
+            <a:r>
+              <a:rPr lang="en-ZA" sz="2000" dirty="0" smtClean="0">
+                <a:solidFill>
+                  <a:schemeClr val="bg1"/>
+                </a:solidFill>
+              </a:rPr>
+              <a:t>execution of code.</a:t>
+            </a:r>
+            <a:endParaRPr lang="en-ZA" sz="2000" dirty="0" smtClean="0">
+              <a:solidFill>
+                <a:schemeClr val="bg1"/>
+              </a:solidFill>
+            </a:endParaRPr>
+          </a:p>
+          <a:p>
+            <a:pPr marL="514350" indent="-514350" algn="just">
+              <a:buFont typeface="+mj-lt"/>
+              <a:buAutoNum type="arabicPeriod"/>
+            </a:pPr>
+            <a:r>
+              <a:rPr lang="en-ZA" sz="2000" dirty="0" smtClean="0">
+                <a:solidFill>
+                  <a:schemeClr val="bg1"/>
+                </a:solidFill>
+              </a:rPr>
+              <a:t>Just used some patience and tried to focus on what could be done at that time.</a:t>
+            </a:r>
             <a:endParaRPr lang="en-ZA" dirty="0">
               <a:solidFill>
                 <a:schemeClr val="bg1"/>
@@ -4772,7 +5071,7 @@
     </p:spTree>
     <p:extLst>
       <p:ext uri="{BB962C8B-B14F-4D97-AF65-F5344CB8AC3E}">
-        <p14:creationId xmlns:p14="http://schemas.microsoft.com/office/powerpoint/2010/main" val="3329563870"/>
+        <p14:creationId xmlns:p14="http://schemas.microsoft.com/office/powerpoint/2010/main" xmlns="" val="3329563870"/>
       </p:ext>
     </p:extLst>
   </p:cSld>
@@ -5321,7 +5620,7 @@
     </p:spTree>
     <p:extLst>
       <p:ext uri="{BB962C8B-B14F-4D97-AF65-F5344CB8AC3E}">
-        <p14:creationId xmlns:p14="http://schemas.microsoft.com/office/powerpoint/2010/main" val="446071776"/>
+        <p14:creationId xmlns:p14="http://schemas.microsoft.com/office/powerpoint/2010/main" xmlns="" val="446071776"/>
       </p:ext>
     </p:extLst>
   </p:cSld>
@@ -5483,11 +5782,6 @@
               </a:rPr>
               <a:t>: </a:t>
             </a:r>
-            <a:endParaRPr lang="en-ZA" sz="2000" dirty="0" smtClean="0">
-              <a:solidFill>
-                <a:schemeClr val="bg1"/>
-              </a:solidFill>
-            </a:endParaRPr>
           </a:p>
           <a:p>
             <a:pPr marL="0" indent="0" algn="just">
@@ -5501,11 +5795,6 @@
               </a:rPr>
               <a:t>Void function. Accepts one parameter - authorization ID.</a:t>
             </a:r>
-            <a:endParaRPr lang="en-ZA" sz="1900" dirty="0" smtClean="0">
-              <a:solidFill>
-                <a:schemeClr val="bg1"/>
-              </a:solidFill>
-            </a:endParaRPr>
           </a:p>
           <a:p>
             <a:pPr marL="0" indent="0" algn="just">
@@ -5517,21 +5806,8 @@
                   <a:schemeClr val="bg1"/>
                 </a:solidFill>
               </a:rPr>
-              <a:t>The aim of the function is "remove" an authorization of a restriction by setting a "deleted" flag to true</a:t>
-            </a:r>
-            <a:r>
-              <a:rPr lang="en-ZA" sz="1900" dirty="0" smtClean="0">
-                <a:solidFill>
-                  <a:schemeClr val="bg1"/>
-                </a:solidFill>
-              </a:rPr>
-              <a:t>. Since nothing may leave the system.</a:t>
-            </a:r>
-            <a:endParaRPr lang="en-ZA" sz="1900" dirty="0" smtClean="0">
-              <a:solidFill>
-                <a:schemeClr val="bg1"/>
-              </a:solidFill>
-            </a:endParaRPr>
+              <a:t>The aim of the function is "remove" an authorization of a restriction by setting a "deleted" flag to true. Since nothing may leave the system.</a:t>
+            </a:r>
           </a:p>
           <a:p>
             <a:pPr marL="0" indent="0" algn="just">
@@ -5861,15 +6137,7 @@
                   <a:schemeClr val="bg1"/>
                 </a:solidFill>
               </a:rPr>
-              <a:t>Challenges </a:t>
-            </a:r>
-            <a:r>
-              <a:rPr lang="en-ZA" sz="6200" b="1" dirty="0" smtClean="0">
-                <a:solidFill>
-                  <a:schemeClr val="bg1"/>
-                </a:solidFill>
-              </a:rPr>
-              <a:t>Faced: </a:t>
+              <a:t>Challenges Faced: </a:t>
             </a:r>
           </a:p>
           <a:p>
@@ -5960,7 +6228,7 @@
     </p:spTree>
     <p:extLst>
       <p:ext uri="{BB962C8B-B14F-4D97-AF65-F5344CB8AC3E}">
-        <p14:creationId xmlns:p14="http://schemas.microsoft.com/office/powerpoint/2010/main" val="4160446826"/>
+        <p14:creationId xmlns:p14="http://schemas.microsoft.com/office/powerpoint/2010/main" xmlns="" val="4160446826"/>
       </p:ext>
     </p:extLst>
   </p:cSld>
@@ -6509,7 +6777,7 @@
     </p:spTree>
     <p:extLst>
       <p:ext uri="{BB962C8B-B14F-4D97-AF65-F5344CB8AC3E}">
-        <p14:creationId xmlns:p14="http://schemas.microsoft.com/office/powerpoint/2010/main" val="109087637"/>
+        <p14:creationId xmlns:p14="http://schemas.microsoft.com/office/powerpoint/2010/main" xmlns="" val="109087637"/>
       </p:ext>
     </p:extLst>
   </p:cSld>
@@ -6709,7 +6977,7 @@
     </p:spTree>
     <p:extLst>
       <p:ext uri="{BB962C8B-B14F-4D97-AF65-F5344CB8AC3E}">
-        <p14:creationId xmlns:p14="http://schemas.microsoft.com/office/powerpoint/2010/main" val="176429030"/>
+        <p14:creationId xmlns:p14="http://schemas.microsoft.com/office/powerpoint/2010/main" xmlns="" val="176429030"/>
       </p:ext>
     </p:extLst>
   </p:cSld>
@@ -6918,7 +7186,7 @@
     </p:spTree>
     <p:extLst>
       <p:ext uri="{BB962C8B-B14F-4D97-AF65-F5344CB8AC3E}">
-        <p14:creationId xmlns:p14="http://schemas.microsoft.com/office/powerpoint/2010/main" val="1129193988"/>
+        <p14:creationId xmlns:p14="http://schemas.microsoft.com/office/powerpoint/2010/main" xmlns="" val="1129193988"/>
       </p:ext>
     </p:extLst>
   </p:cSld>

</xml_diff>

<commit_message>
Material was added to the powerpoint and layout made easier to read.
</commit_message>
<xml_diff>
--- a/Authentication - B.pptx
+++ b/Authentication - B.pptx
@@ -112,6 +112,22 @@
       </a:defRPr>
     </a:lvl9pPr>
   </p:defaultTextStyle>
+  <p:extLst>
+    <p:ext uri="{EFAFB233-063F-42B5-8137-9DF3F51BA10A}">
+      <p15:sldGuideLst xmlns:p15="http://schemas.microsoft.com/office/powerpoint/2012/main">
+        <p15:guide id="1" orient="horz" pos="2160">
+          <p15:clr>
+            <a:srgbClr val="A4A3A4"/>
+          </p15:clr>
+        </p15:guide>
+        <p15:guide id="2" pos="2880">
+          <p15:clr>
+            <a:srgbClr val="A4A3A4"/>
+          </p15:clr>
+        </p15:guide>
+      </p15:sldGuideLst>
+    </p:ext>
+  </p:extLst>
 </p:presentation>
 </file>
 
@@ -297,7 +313,7 @@
             <a:fld id="{BC8B1206-7415-4CAA-BABF-4B2FCC8828A3}" type="datetimeFigureOut">
               <a:rPr lang="en-ZA" smtClean="0"/>
               <a:pPr/>
-              <a:t>2015/04/16</a:t>
+              <a:t>2015-04-17</a:t>
             </a:fld>
             <a:endParaRPr lang="en-ZA"/>
           </a:p>
@@ -349,7 +365,7 @@
     </p:spTree>
     <p:extLst>
       <p:ext uri="{BB962C8B-B14F-4D97-AF65-F5344CB8AC3E}">
-        <p14:creationId xmlns:p14="http://schemas.microsoft.com/office/powerpoint/2010/main" xmlns="" val="32494294"/>
+        <p14:creationId xmlns:p14="http://schemas.microsoft.com/office/powerpoint/2010/main" val="32494294"/>
       </p:ext>
     </p:extLst>
   </p:cSld>
@@ -469,7 +485,7 @@
             <a:fld id="{BC8B1206-7415-4CAA-BABF-4B2FCC8828A3}" type="datetimeFigureOut">
               <a:rPr lang="en-ZA" smtClean="0"/>
               <a:pPr/>
-              <a:t>2015/04/16</a:t>
+              <a:t>2015-04-17</a:t>
             </a:fld>
             <a:endParaRPr lang="en-ZA"/>
           </a:p>
@@ -521,7 +537,7 @@
     </p:spTree>
     <p:extLst>
       <p:ext uri="{BB962C8B-B14F-4D97-AF65-F5344CB8AC3E}">
-        <p14:creationId xmlns:p14="http://schemas.microsoft.com/office/powerpoint/2010/main" xmlns="" val="1407415046"/>
+        <p14:creationId xmlns:p14="http://schemas.microsoft.com/office/powerpoint/2010/main" val="1407415046"/>
       </p:ext>
     </p:extLst>
   </p:cSld>
@@ -651,7 +667,7 @@
             <a:fld id="{BC8B1206-7415-4CAA-BABF-4B2FCC8828A3}" type="datetimeFigureOut">
               <a:rPr lang="en-ZA" smtClean="0"/>
               <a:pPr/>
-              <a:t>2015/04/16</a:t>
+              <a:t>2015-04-17</a:t>
             </a:fld>
             <a:endParaRPr lang="en-ZA"/>
           </a:p>
@@ -703,7 +719,7 @@
     </p:spTree>
     <p:extLst>
       <p:ext uri="{BB962C8B-B14F-4D97-AF65-F5344CB8AC3E}">
-        <p14:creationId xmlns:p14="http://schemas.microsoft.com/office/powerpoint/2010/main" xmlns="" val="3489674815"/>
+        <p14:creationId xmlns:p14="http://schemas.microsoft.com/office/powerpoint/2010/main" val="3489674815"/>
       </p:ext>
     </p:extLst>
   </p:cSld>
@@ -823,7 +839,7 @@
             <a:fld id="{BC8B1206-7415-4CAA-BABF-4B2FCC8828A3}" type="datetimeFigureOut">
               <a:rPr lang="en-ZA" smtClean="0"/>
               <a:pPr/>
-              <a:t>2015/04/16</a:t>
+              <a:t>2015-04-17</a:t>
             </a:fld>
             <a:endParaRPr lang="en-ZA"/>
           </a:p>
@@ -875,7 +891,7 @@
     </p:spTree>
     <p:extLst>
       <p:ext uri="{BB962C8B-B14F-4D97-AF65-F5344CB8AC3E}">
-        <p14:creationId xmlns:p14="http://schemas.microsoft.com/office/powerpoint/2010/main" xmlns="" val="3922563659"/>
+        <p14:creationId xmlns:p14="http://schemas.microsoft.com/office/powerpoint/2010/main" val="3922563659"/>
       </p:ext>
     </p:extLst>
   </p:cSld>
@@ -1071,7 +1087,7 @@
             <a:fld id="{BC8B1206-7415-4CAA-BABF-4B2FCC8828A3}" type="datetimeFigureOut">
               <a:rPr lang="en-ZA" smtClean="0"/>
               <a:pPr/>
-              <a:t>2015/04/16</a:t>
+              <a:t>2015-04-17</a:t>
             </a:fld>
             <a:endParaRPr lang="en-ZA"/>
           </a:p>
@@ -1123,7 +1139,7 @@
     </p:spTree>
     <p:extLst>
       <p:ext uri="{BB962C8B-B14F-4D97-AF65-F5344CB8AC3E}">
-        <p14:creationId xmlns:p14="http://schemas.microsoft.com/office/powerpoint/2010/main" xmlns="" val="2839950182"/>
+        <p14:creationId xmlns:p14="http://schemas.microsoft.com/office/powerpoint/2010/main" val="2839950182"/>
       </p:ext>
     </p:extLst>
   </p:cSld>
@@ -1361,7 +1377,7 @@
             <a:fld id="{BC8B1206-7415-4CAA-BABF-4B2FCC8828A3}" type="datetimeFigureOut">
               <a:rPr lang="en-ZA" smtClean="0"/>
               <a:pPr/>
-              <a:t>2015/04/16</a:t>
+              <a:t>2015-04-17</a:t>
             </a:fld>
             <a:endParaRPr lang="en-ZA"/>
           </a:p>
@@ -1413,7 +1429,7 @@
     </p:spTree>
     <p:extLst>
       <p:ext uri="{BB962C8B-B14F-4D97-AF65-F5344CB8AC3E}">
-        <p14:creationId xmlns:p14="http://schemas.microsoft.com/office/powerpoint/2010/main" xmlns="" val="3287254344"/>
+        <p14:creationId xmlns:p14="http://schemas.microsoft.com/office/powerpoint/2010/main" val="3287254344"/>
       </p:ext>
     </p:extLst>
   </p:cSld>
@@ -1785,7 +1801,7 @@
             <a:fld id="{BC8B1206-7415-4CAA-BABF-4B2FCC8828A3}" type="datetimeFigureOut">
               <a:rPr lang="en-ZA" smtClean="0"/>
               <a:pPr/>
-              <a:t>2015/04/16</a:t>
+              <a:t>2015-04-17</a:t>
             </a:fld>
             <a:endParaRPr lang="en-ZA"/>
           </a:p>
@@ -1837,7 +1853,7 @@
     </p:spTree>
     <p:extLst>
       <p:ext uri="{BB962C8B-B14F-4D97-AF65-F5344CB8AC3E}">
-        <p14:creationId xmlns:p14="http://schemas.microsoft.com/office/powerpoint/2010/main" xmlns="" val="2992548387"/>
+        <p14:creationId xmlns:p14="http://schemas.microsoft.com/office/powerpoint/2010/main" val="2992548387"/>
       </p:ext>
     </p:extLst>
   </p:cSld>
@@ -1905,7 +1921,7 @@
             <a:fld id="{BC8B1206-7415-4CAA-BABF-4B2FCC8828A3}" type="datetimeFigureOut">
               <a:rPr lang="en-ZA" smtClean="0"/>
               <a:pPr/>
-              <a:t>2015/04/16</a:t>
+              <a:t>2015-04-17</a:t>
             </a:fld>
             <a:endParaRPr lang="en-ZA"/>
           </a:p>
@@ -1957,7 +1973,7 @@
     </p:spTree>
     <p:extLst>
       <p:ext uri="{BB962C8B-B14F-4D97-AF65-F5344CB8AC3E}">
-        <p14:creationId xmlns:p14="http://schemas.microsoft.com/office/powerpoint/2010/main" xmlns="" val="4081995342"/>
+        <p14:creationId xmlns:p14="http://schemas.microsoft.com/office/powerpoint/2010/main" val="4081995342"/>
       </p:ext>
     </p:extLst>
   </p:cSld>
@@ -2002,7 +2018,7 @@
             <a:fld id="{BC8B1206-7415-4CAA-BABF-4B2FCC8828A3}" type="datetimeFigureOut">
               <a:rPr lang="en-ZA" smtClean="0"/>
               <a:pPr/>
-              <a:t>2015/04/16</a:t>
+              <a:t>2015-04-17</a:t>
             </a:fld>
             <a:endParaRPr lang="en-ZA"/>
           </a:p>
@@ -2054,7 +2070,7 @@
     </p:spTree>
     <p:extLst>
       <p:ext uri="{BB962C8B-B14F-4D97-AF65-F5344CB8AC3E}">
-        <p14:creationId xmlns:p14="http://schemas.microsoft.com/office/powerpoint/2010/main" xmlns="" val="1897818696"/>
+        <p14:creationId xmlns:p14="http://schemas.microsoft.com/office/powerpoint/2010/main" val="1897818696"/>
       </p:ext>
     </p:extLst>
   </p:cSld>
@@ -2281,7 +2297,7 @@
             <a:fld id="{BC8B1206-7415-4CAA-BABF-4B2FCC8828A3}" type="datetimeFigureOut">
               <a:rPr lang="en-ZA" smtClean="0"/>
               <a:pPr/>
-              <a:t>2015/04/16</a:t>
+              <a:t>2015-04-17</a:t>
             </a:fld>
             <a:endParaRPr lang="en-ZA"/>
           </a:p>
@@ -2333,7 +2349,7 @@
     </p:spTree>
     <p:extLst>
       <p:ext uri="{BB962C8B-B14F-4D97-AF65-F5344CB8AC3E}">
-        <p14:creationId xmlns:p14="http://schemas.microsoft.com/office/powerpoint/2010/main" xmlns="" val="2349542582"/>
+        <p14:creationId xmlns:p14="http://schemas.microsoft.com/office/powerpoint/2010/main" val="2349542582"/>
       </p:ext>
     </p:extLst>
   </p:cSld>
@@ -2536,7 +2552,7 @@
             <a:fld id="{BC8B1206-7415-4CAA-BABF-4B2FCC8828A3}" type="datetimeFigureOut">
               <a:rPr lang="en-ZA" smtClean="0"/>
               <a:pPr/>
-              <a:t>2015/04/16</a:t>
+              <a:t>2015-04-17</a:t>
             </a:fld>
             <a:endParaRPr lang="en-ZA"/>
           </a:p>
@@ -2588,7 +2604,7 @@
     </p:spTree>
     <p:extLst>
       <p:ext uri="{BB962C8B-B14F-4D97-AF65-F5344CB8AC3E}">
-        <p14:creationId xmlns:p14="http://schemas.microsoft.com/office/powerpoint/2010/main" xmlns="" val="1781508516"/>
+        <p14:creationId xmlns:p14="http://schemas.microsoft.com/office/powerpoint/2010/main" val="1781508516"/>
       </p:ext>
     </p:extLst>
   </p:cSld>
@@ -2760,7 +2776,7 @@
             <a:fld id="{BC8B1206-7415-4CAA-BABF-4B2FCC8828A3}" type="datetimeFigureOut">
               <a:rPr lang="en-ZA" smtClean="0"/>
               <a:pPr/>
-              <a:t>2015/04/16</a:t>
+              <a:t>2015-04-17</a:t>
             </a:fld>
             <a:endParaRPr lang="en-ZA"/>
           </a:p>
@@ -2848,7 +2864,7 @@
     </p:spTree>
     <p:extLst>
       <p:ext uri="{BB962C8B-B14F-4D97-AF65-F5344CB8AC3E}">
-        <p14:creationId xmlns:p14="http://schemas.microsoft.com/office/powerpoint/2010/main" xmlns="" val="2839475855"/>
+        <p14:creationId xmlns:p14="http://schemas.microsoft.com/office/powerpoint/2010/main" val="2839475855"/>
       </p:ext>
     </p:extLst>
   </p:cSld>
@@ -3302,6 +3318,17 @@
                   <a:schemeClr val="bg1"/>
                 </a:solidFill>
               </a:rPr>
+              <a:t>	 12247040 - Team Lead</a:t>
+            </a:r>
+          </a:p>
+          <a:p>
+            <a:pPr algn="l"/>
+            <a:r>
+              <a:rPr lang="en-ZA" dirty="0">
+                <a:solidFill>
+                  <a:schemeClr val="bg1"/>
+                </a:solidFill>
+              </a:rPr>
               <a:t>	</a:t>
             </a:r>
             <a:r>
@@ -3310,7 +3337,15 @@
                   <a:schemeClr val="bg1"/>
                 </a:solidFill>
               </a:rPr>
-              <a:t> 12247040 </a:t>
+              <a:t>Jessica </a:t>
+            </a:r>
+            <a:r>
+              <a:rPr lang="en-ZA" dirty="0" err="1" smtClean="0">
+                <a:solidFill>
+                  <a:schemeClr val="bg1"/>
+                </a:solidFill>
+              </a:rPr>
+              <a:t>Lessev</a:t>
             </a:r>
             <a:r>
               <a:rPr lang="en-ZA" dirty="0" smtClean="0">
@@ -3318,7 +3353,7 @@
                   <a:schemeClr val="bg1"/>
                 </a:solidFill>
               </a:rPr>
-              <a:t>- Team Lead</a:t>
+              <a:t>	 13049136</a:t>
             </a:r>
           </a:p>
           <a:p>
@@ -3337,7 +3372,7 @@
                   <a:schemeClr val="bg1"/>
                 </a:solidFill>
               </a:rPr>
-              <a:t>Jessica </a:t>
+              <a:t>Armand </a:t>
             </a:r>
             <a:r>
               <a:rPr lang="en-ZA" dirty="0" err="1" smtClean="0">
@@ -3345,7 +3380,15 @@
                   <a:schemeClr val="bg1"/>
                 </a:solidFill>
               </a:rPr>
-              <a:t>Lessev</a:t>
+              <a:t>Pieterse</a:t>
+            </a:r>
+            <a:r>
+              <a:rPr lang="en-ZA" dirty="0">
+                <a:solidFill>
+                  <a:schemeClr val="bg1"/>
+                </a:solidFill>
+              </a:rPr>
+              <a:t> </a:t>
             </a:r>
             <a:r>
               <a:rPr lang="en-ZA" dirty="0" smtClean="0">
@@ -3353,31 +3396,50 @@
                   <a:schemeClr val="bg1"/>
                 </a:solidFill>
               </a:rPr>
+              <a:t>12167844 </a:t>
+            </a:r>
+          </a:p>
+          <a:p>
+            <a:pPr algn="l"/>
+            <a:r>
+              <a:rPr lang="en-ZA" dirty="0">
+                <a:solidFill>
+                  <a:schemeClr val="bg1"/>
+                </a:solidFill>
+              </a:rPr>
               <a:t>	</a:t>
             </a:r>
             <a:r>
+              <a:rPr lang="en-ZA" dirty="0" err="1" smtClean="0">
+                <a:solidFill>
+                  <a:schemeClr val="bg1"/>
+                </a:solidFill>
+              </a:rPr>
+              <a:t>Kaleab</a:t>
+            </a:r>
+            <a:r>
               <a:rPr lang="en-ZA" dirty="0" smtClean="0">
                 <a:solidFill>
                   <a:schemeClr val="bg1"/>
                 </a:solidFill>
               </a:rPr>
-              <a:t> 13049136</a:t>
-            </a:r>
-            <a:endParaRPr lang="en-ZA" dirty="0" smtClean="0">
-              <a:solidFill>
-                <a:schemeClr val="bg1"/>
-              </a:solidFill>
-            </a:endParaRPr>
-          </a:p>
-          <a:p>
-            <a:pPr algn="l"/>
+              <a:t> </a:t>
+            </a:r>
+            <a:r>
+              <a:rPr lang="en-ZA" dirty="0" err="1">
+                <a:solidFill>
+                  <a:schemeClr val="bg1"/>
+                </a:solidFill>
+              </a:rPr>
+              <a:t>Tessera</a:t>
+            </a:r>
             <a:r>
               <a:rPr lang="en-ZA" dirty="0">
                 <a:solidFill>
                   <a:schemeClr val="bg1"/>
                 </a:solidFill>
               </a:rPr>
-              <a:t>	</a:t>
+              <a:t> </a:t>
             </a:r>
             <a:r>
               <a:rPr lang="en-ZA" dirty="0" smtClean="0">
@@ -3385,101 +3447,8 @@
                   <a:schemeClr val="bg1"/>
                 </a:solidFill>
               </a:rPr>
-              <a:t>Armand </a:t>
-            </a:r>
-            <a:r>
-              <a:rPr lang="en-ZA" dirty="0" err="1" smtClean="0">
-                <a:solidFill>
-                  <a:schemeClr val="bg1"/>
-                </a:solidFill>
-              </a:rPr>
-              <a:t>Pieterse</a:t>
-            </a:r>
-            <a:r>
-              <a:rPr lang="en-ZA" dirty="0">
-                <a:solidFill>
-                  <a:schemeClr val="bg1"/>
-                </a:solidFill>
-              </a:rPr>
-              <a:t> </a:t>
-            </a:r>
-            <a:r>
-              <a:rPr lang="en-ZA" dirty="0" smtClean="0">
-                <a:solidFill>
-                  <a:schemeClr val="bg1"/>
-                </a:solidFill>
-              </a:rPr>
-              <a:t>12167844 </a:t>
-            </a:r>
-            <a:endParaRPr lang="en-ZA" dirty="0" smtClean="0">
-              <a:solidFill>
-                <a:schemeClr val="bg1"/>
-              </a:solidFill>
-            </a:endParaRPr>
-          </a:p>
-          <a:p>
-            <a:pPr algn="l"/>
-            <a:r>
-              <a:rPr lang="en-ZA" dirty="0">
-                <a:solidFill>
-                  <a:schemeClr val="bg1"/>
-                </a:solidFill>
-              </a:rPr>
-              <a:t>	</a:t>
-            </a:r>
-            <a:r>
-              <a:rPr lang="en-ZA" dirty="0" err="1" smtClean="0">
-                <a:solidFill>
-                  <a:schemeClr val="bg1"/>
-                </a:solidFill>
-              </a:rPr>
-              <a:t>Kaleab</a:t>
-            </a:r>
-            <a:r>
-              <a:rPr lang="en-ZA" dirty="0" smtClean="0">
-                <a:solidFill>
-                  <a:schemeClr val="bg1"/>
-                </a:solidFill>
-              </a:rPr>
-              <a:t> </a:t>
-            </a:r>
-            <a:r>
-              <a:rPr lang="en-ZA" dirty="0" err="1">
-                <a:solidFill>
-                  <a:schemeClr val="bg1"/>
-                </a:solidFill>
-              </a:rPr>
-              <a:t>Tessera</a:t>
-            </a:r>
-            <a:r>
-              <a:rPr lang="en-ZA" dirty="0">
-                <a:solidFill>
-                  <a:schemeClr val="bg1"/>
-                </a:solidFill>
-              </a:rPr>
-              <a:t> </a:t>
-            </a:r>
-            <a:r>
-              <a:rPr lang="en-ZA" dirty="0" smtClean="0">
-                <a:solidFill>
-                  <a:schemeClr val="bg1"/>
-                </a:solidFill>
-              </a:rPr>
-              <a:t>	</a:t>
-            </a:r>
-            <a:r>
-              <a:rPr lang="en-ZA" dirty="0" smtClean="0">
-                <a:solidFill>
-                  <a:schemeClr val="bg1"/>
-                </a:solidFill>
-              </a:rPr>
-              <a:t> 13048423</a:t>
-            </a:r>
-            <a:endParaRPr lang="en-ZA" dirty="0" smtClean="0">
-              <a:solidFill>
-                <a:schemeClr val="bg1"/>
-              </a:solidFill>
-            </a:endParaRPr>
+              <a:t>	 13048423</a:t>
+            </a:r>
           </a:p>
           <a:p>
             <a:pPr algn="l"/>
@@ -3502,7 +3471,7 @@
     </p:spTree>
     <p:extLst>
       <p:ext uri="{BB962C8B-B14F-4D97-AF65-F5344CB8AC3E}">
-        <p14:creationId xmlns:p14="http://schemas.microsoft.com/office/powerpoint/2010/main" xmlns="" val="308255282"/>
+        <p14:creationId xmlns:p14="http://schemas.microsoft.com/office/powerpoint/2010/main" val="308255282"/>
       </p:ext>
     </p:extLst>
   </p:cSld>
@@ -3645,7 +3614,7 @@
     </p:spTree>
     <p:extLst>
       <p:ext uri="{BB962C8B-B14F-4D97-AF65-F5344CB8AC3E}">
-        <p14:creationId xmlns:p14="http://schemas.microsoft.com/office/powerpoint/2010/main" xmlns="" val="2165796761"/>
+        <p14:creationId xmlns:p14="http://schemas.microsoft.com/office/powerpoint/2010/main" val="2165796761"/>
       </p:ext>
     </p:extLst>
   </p:cSld>
@@ -3816,7 +3785,7 @@
         </p:spPr>
         <p:txBody>
           <a:bodyPr>
-            <a:normAutofit fontScale="40000" lnSpcReduction="20000"/>
+            <a:normAutofit fontScale="62500" lnSpcReduction="20000"/>
           </a:bodyPr>
           <a:lstStyle/>
           <a:p>
@@ -3824,7 +3793,7 @@
               <a:buNone/>
             </a:pPr>
             <a:r>
-              <a:rPr lang="en-ZA" sz="8000" b="1" dirty="0" smtClean="0">
+              <a:rPr lang="en-ZA" sz="5000" b="1" u="sng" dirty="0" smtClean="0">
                 <a:solidFill>
                   <a:schemeClr val="bg1"/>
                 </a:solidFill>
@@ -3832,15 +3801,25 @@
               <a:t>Description</a:t>
             </a:r>
             <a:r>
-              <a:rPr lang="en-ZA" sz="8000" dirty="0" smtClean="0">
+              <a:rPr lang="en-ZA" sz="5000" u="sng" dirty="0" smtClean="0">
                 <a:solidFill>
                   <a:schemeClr val="bg1"/>
                 </a:solidFill>
               </a:rPr>
               <a:t>: </a:t>
             </a:r>
-            <a:r>
-              <a:rPr lang="en-ZA" sz="6400" dirty="0" smtClean="0">
+            <a:endParaRPr lang="en-ZA" sz="5000" u="sng" dirty="0" smtClean="0">
+              <a:solidFill>
+                <a:schemeClr val="bg1"/>
+              </a:solidFill>
+            </a:endParaRPr>
+          </a:p>
+          <a:p>
+            <a:pPr marL="0" indent="0" algn="just">
+              <a:buNone/>
+            </a:pPr>
+            <a:r>
+              <a:rPr lang="en-ZA" sz="3400" dirty="0" smtClean="0">
                 <a:solidFill>
                   <a:schemeClr val="bg1"/>
                 </a:solidFill>
@@ -3863,12 +3842,20 @@
               <a:buNone/>
             </a:pPr>
             <a:r>
-              <a:rPr lang="en-ZA" sz="8000" b="1" dirty="0" smtClean="0">
-                <a:solidFill>
-                  <a:schemeClr val="bg1"/>
-                </a:solidFill>
-              </a:rPr>
-              <a:t>Pre and Post Conditions:</a:t>
+              <a:rPr lang="en-ZA" sz="5000" b="1" u="sng" dirty="0" smtClean="0">
+                <a:solidFill>
+                  <a:schemeClr val="bg1"/>
+                </a:solidFill>
+              </a:rPr>
+              <a:t>Pre and </a:t>
+            </a:r>
+            <a:r>
+              <a:rPr lang="en-ZA" sz="5000" b="1" u="sng" dirty="0" smtClean="0">
+                <a:solidFill>
+                  <a:schemeClr val="bg1"/>
+                </a:solidFill>
+              </a:rPr>
+              <a:t>Post Conditions:</a:t>
             </a:r>
           </a:p>
           <a:p>
@@ -4110,7 +4097,7 @@
               <a:buNone/>
             </a:pPr>
             <a:r>
-              <a:rPr lang="en-ZA" sz="2200" b="1" dirty="0" smtClean="0">
+              <a:rPr lang="en-ZA" sz="2000" b="1" u="sng" dirty="0" smtClean="0">
                 <a:solidFill>
                   <a:schemeClr val="bg1"/>
                 </a:solidFill>
@@ -4124,7 +4111,7 @@
               <a:buAutoNum type="arabicPeriod"/>
             </a:pPr>
             <a:r>
-              <a:rPr lang="en-ZA" sz="1700" dirty="0">
+              <a:rPr lang="en-ZA" sz="1600" dirty="0">
                 <a:solidFill>
                   <a:schemeClr val="bg1"/>
                 </a:solidFill>
@@ -4132,7 +4119,7 @@
               <a:t>Did not know how to define a class in JavaScript</a:t>
             </a:r>
             <a:r>
-              <a:rPr lang="en-ZA" sz="1700" dirty="0" smtClean="0">
+              <a:rPr lang="en-ZA" sz="1600" dirty="0" smtClean="0">
                 <a:solidFill>
                   <a:schemeClr val="bg1"/>
                 </a:solidFill>
@@ -4146,14 +4133,14 @@
               <a:buAutoNum type="arabicPeriod"/>
             </a:pPr>
             <a:r>
-              <a:rPr lang="en-ZA" sz="1700" dirty="0" smtClean="0">
+              <a:rPr lang="en-ZA" sz="1600" dirty="0" smtClean="0">
                 <a:solidFill>
                   <a:schemeClr val="bg1"/>
                 </a:solidFill>
               </a:rPr>
               <a:t>The function calls to the database returned asynchronously.</a:t>
             </a:r>
-            <a:endParaRPr lang="en-ZA" sz="1700" dirty="0">
+            <a:endParaRPr lang="en-ZA" sz="1600" dirty="0">
               <a:solidFill>
                 <a:schemeClr val="bg1"/>
               </a:solidFill>
@@ -4175,7 +4162,7 @@
               <a:buNone/>
             </a:pPr>
             <a:r>
-              <a:rPr lang="en-ZA" sz="2200" b="1" dirty="0" smtClean="0">
+              <a:rPr lang="en-ZA" sz="2000" b="1" u="sng" dirty="0" smtClean="0">
                 <a:solidFill>
                   <a:schemeClr val="bg1"/>
                 </a:solidFill>
@@ -4216,21 +4203,8 @@
                   <a:schemeClr val="bg1"/>
                 </a:solidFill>
               </a:rPr>
-              <a:t>By embedding functions within one another, the values returned are used for the next call to </a:t>
-            </a:r>
-            <a:r>
-              <a:rPr lang="en-ZA" sz="1600" smtClean="0">
-                <a:solidFill>
-                  <a:schemeClr val="bg1"/>
-                </a:solidFill>
-              </a:rPr>
-              <a:t>the database.</a:t>
-            </a:r>
-            <a:endParaRPr lang="en-ZA" sz="1600" dirty="0" smtClean="0">
-              <a:solidFill>
-                <a:schemeClr val="bg1"/>
-              </a:solidFill>
-            </a:endParaRPr>
+              <a:t>By embedding functions within one another, the values returned are used for the next call to the database.</a:t>
+            </a:r>
           </a:p>
           <a:p>
             <a:pPr marL="514350" indent="-514350" algn="just">
@@ -4294,7 +4268,7 @@
     </p:spTree>
     <p:extLst>
       <p:ext uri="{BB962C8B-B14F-4D97-AF65-F5344CB8AC3E}">
-        <p14:creationId xmlns:p14="http://schemas.microsoft.com/office/powerpoint/2010/main" xmlns="" val="3871235512"/>
+        <p14:creationId xmlns:p14="http://schemas.microsoft.com/office/powerpoint/2010/main" val="3871235512"/>
       </p:ext>
     </p:extLst>
   </p:cSld>
@@ -4388,7 +4362,23 @@
                   <a:schemeClr val="bg1"/>
                 </a:solidFill>
               </a:rPr>
-              <a:t>Authors:</a:t>
+              <a:t>Authors</a:t>
+            </a:r>
+            <a:r>
+              <a:rPr lang="en-ZA" sz="2200" u="sng" dirty="0">
+                <a:solidFill>
+                  <a:schemeClr val="bg1"/>
+                </a:solidFill>
+              </a:rPr>
+              <a:t>: Armand </a:t>
+            </a:r>
+            <a:r>
+              <a:rPr lang="en-ZA" sz="2200" u="sng" dirty="0" err="1">
+                <a:solidFill>
+                  <a:schemeClr val="bg1"/>
+                </a:solidFill>
+              </a:rPr>
+              <a:t>Pieterse</a:t>
             </a:r>
             <a:endParaRPr lang="en-ZA" sz="2200" u="sng" dirty="0">
               <a:solidFill>
@@ -4425,7 +4415,7 @@
         </p:spPr>
         <p:txBody>
           <a:bodyPr>
-            <a:normAutofit lnSpcReduction="10000"/>
+            <a:normAutofit fontScale="92500" lnSpcReduction="10000"/>
           </a:bodyPr>
           <a:lstStyle/>
           <a:p>
@@ -4433,7 +4423,7 @@
               <a:buNone/>
             </a:pPr>
             <a:r>
-              <a:rPr lang="en-ZA" sz="2000" b="1" dirty="0" smtClean="0">
+              <a:rPr lang="en-ZA" sz="2000" b="1" u="sng" dirty="0" smtClean="0">
                 <a:solidFill>
                   <a:schemeClr val="bg1"/>
                 </a:solidFill>
@@ -4441,7 +4431,7 @@
               <a:t>Description</a:t>
             </a:r>
             <a:r>
-              <a:rPr lang="en-ZA" sz="2000" dirty="0" smtClean="0">
+              <a:rPr lang="en-ZA" sz="2000" u="sng" dirty="0" smtClean="0">
                 <a:solidFill>
                   <a:schemeClr val="bg1"/>
                 </a:solidFill>
@@ -4485,7 +4475,15 @@
                   <a:schemeClr val="bg1"/>
                 </a:solidFill>
               </a:rPr>
-              <a:t> </a:t>
+              <a:t> for a specific service, based on a minimum role and minimum </a:t>
+            </a:r>
+            <a:r>
+              <a:rPr lang="en-ZA" sz="1800" dirty="0" err="1" smtClean="0">
+                <a:solidFill>
+                  <a:schemeClr val="bg1"/>
+                </a:solidFill>
+              </a:rPr>
+              <a:t>statuspoints</a:t>
             </a:r>
             <a:r>
               <a:rPr lang="en-ZA" sz="1800" dirty="0" smtClean="0">
@@ -4493,7 +4491,89 @@
                   <a:schemeClr val="bg1"/>
                 </a:solidFill>
               </a:rPr>
-              <a:t>for a specific service, based on a minimum role and minimum </a:t>
+              <a:t>, if the required conditions are met.</a:t>
+            </a:r>
+            <a:endParaRPr lang="en-ZA" sz="1800" dirty="0">
+              <a:solidFill>
+                <a:schemeClr val="bg1"/>
+              </a:solidFill>
+            </a:endParaRPr>
+          </a:p>
+          <a:p>
+            <a:pPr marL="0" indent="0" algn="just">
+              <a:buNone/>
+            </a:pPr>
+            <a:endParaRPr lang="en-ZA" sz="1000" dirty="0" smtClean="0">
+              <a:solidFill>
+                <a:schemeClr val="bg1"/>
+              </a:solidFill>
+            </a:endParaRPr>
+          </a:p>
+          <a:p>
+            <a:pPr marL="0" indent="0" algn="just">
+              <a:buNone/>
+            </a:pPr>
+            <a:r>
+              <a:rPr lang="en-ZA" sz="2000" b="1" u="sng" dirty="0">
+                <a:solidFill>
+                  <a:schemeClr val="bg1"/>
+                </a:solidFill>
+              </a:rPr>
+              <a:t>Pre and Post Conditions</a:t>
+            </a:r>
+            <a:r>
+              <a:rPr lang="en-ZA" sz="2000" b="1" u="sng" dirty="0" smtClean="0">
+                <a:solidFill>
+                  <a:schemeClr val="bg1"/>
+                </a:solidFill>
+              </a:rPr>
+              <a:t>:</a:t>
+            </a:r>
+          </a:p>
+          <a:p>
+            <a:pPr marL="0" indent="0" algn="just">
+              <a:buNone/>
+            </a:pPr>
+            <a:endParaRPr lang="en-ZA" sz="1000" b="1" dirty="0">
+              <a:solidFill>
+                <a:schemeClr val="bg1"/>
+              </a:solidFill>
+            </a:endParaRPr>
+          </a:p>
+          <a:p>
+            <a:pPr algn="just">
+              <a:buFont typeface="Wingdings" panose="05000000000000000000" pitchFamily="2" charset="2"/>
+              <a:buChar char="Ø"/>
+            </a:pPr>
+            <a:r>
+              <a:rPr lang="en-ZA" sz="1800" dirty="0" smtClean="0">
+                <a:solidFill>
+                  <a:schemeClr val="bg1"/>
+                </a:solidFill>
+              </a:rPr>
+              <a:t>Specific </a:t>
+            </a:r>
+            <a:r>
+              <a:rPr lang="en-ZA" sz="1800" dirty="0" smtClean="0">
+                <a:solidFill>
+                  <a:schemeClr val="bg1"/>
+                </a:solidFill>
+              </a:rPr>
+              <a:t>restriction should not exist.</a:t>
+            </a:r>
+          </a:p>
+          <a:p>
+            <a:pPr algn="just">
+              <a:buFont typeface="Wingdings" panose="05000000000000000000" pitchFamily="2" charset="2"/>
+              <a:buChar char="Ø"/>
+            </a:pPr>
+            <a:r>
+              <a:rPr lang="en-ZA" sz="1800" dirty="0" smtClean="0">
+                <a:solidFill>
+                  <a:schemeClr val="bg1"/>
+                </a:solidFill>
+              </a:rPr>
+              <a:t>Specified </a:t>
             </a:r>
             <a:r>
               <a:rPr lang="en-ZA" sz="1800" dirty="0" err="1" smtClean="0">
@@ -4501,7 +4581,7 @@
                   <a:schemeClr val="bg1"/>
                 </a:solidFill>
               </a:rPr>
-              <a:t>statuspoints</a:t>
+              <a:t>buzzSpace</a:t>
             </a:r>
             <a:r>
               <a:rPr lang="en-ZA" sz="1800" dirty="0" smtClean="0">
@@ -4509,58 +4589,13 @@
                   <a:schemeClr val="bg1"/>
                 </a:solidFill>
               </a:rPr>
-              <a:t>, if the required conditions are met.</a:t>
-            </a:r>
-            <a:endParaRPr lang="en-ZA" sz="1800" dirty="0">
-              <a:solidFill>
-                <a:schemeClr val="bg1"/>
-              </a:solidFill>
-            </a:endParaRPr>
-          </a:p>
-          <a:p>
-            <a:pPr marL="0" indent="0" algn="just">
-              <a:buNone/>
-            </a:pPr>
-            <a:endParaRPr lang="en-ZA" sz="1000" dirty="0" smtClean="0">
-              <a:solidFill>
-                <a:schemeClr val="bg1"/>
-              </a:solidFill>
-            </a:endParaRPr>
-          </a:p>
-          <a:p>
-            <a:pPr marL="0" indent="0" algn="just">
-              <a:buNone/>
-            </a:pPr>
-            <a:r>
-              <a:rPr lang="en-ZA" sz="2000" b="1" dirty="0">
-                <a:solidFill>
-                  <a:schemeClr val="bg1"/>
-                </a:solidFill>
-              </a:rPr>
-              <a:t>Pre and Post Conditions</a:t>
-            </a:r>
-            <a:r>
-              <a:rPr lang="en-ZA" sz="2000" b="1" dirty="0" smtClean="0">
-                <a:solidFill>
-                  <a:schemeClr val="bg1"/>
-                </a:solidFill>
-              </a:rPr>
-              <a:t>:</a:t>
-            </a:r>
-          </a:p>
-          <a:p>
-            <a:pPr marL="0" indent="0" algn="just">
-              <a:buNone/>
-            </a:pPr>
-            <a:endParaRPr lang="en-ZA" sz="1000" b="1" dirty="0">
-              <a:solidFill>
-                <a:schemeClr val="bg1"/>
-              </a:solidFill>
-            </a:endParaRPr>
-          </a:p>
-          <a:p>
-            <a:pPr marL="0" indent="0" algn="just">
-              <a:buNone/>
+              <a:t> should Exist.</a:t>
+            </a:r>
+          </a:p>
+          <a:p>
+            <a:pPr algn="just">
+              <a:buFont typeface="Wingdings" panose="05000000000000000000" pitchFamily="2" charset="2"/>
+              <a:buChar char="Ø"/>
             </a:pPr>
             <a:r>
               <a:rPr lang="en-ZA" sz="1800" dirty="0" smtClean="0">
@@ -4568,7 +4603,7 @@
                   <a:schemeClr val="bg1"/>
                 </a:solidFill>
               </a:rPr>
-              <a:t>*Specific r</a:t>
+              <a:t>Specified </a:t>
             </a:r>
             <a:r>
               <a:rPr lang="en-ZA" sz="1800" dirty="0" smtClean="0">
@@ -4576,12 +4611,13 @@
                   <a:schemeClr val="bg1"/>
                 </a:solidFill>
               </a:rPr>
-              <a:t>estriction should not exist.</a:t>
-            </a:r>
-          </a:p>
-          <a:p>
-            <a:pPr marL="0" indent="0" algn="just">
-              <a:buNone/>
+              <a:t>service should Exist.</a:t>
+            </a:r>
+          </a:p>
+          <a:p>
+            <a:pPr algn="just">
+              <a:buFont typeface="Wingdings" panose="05000000000000000000" pitchFamily="2" charset="2"/>
+              <a:buChar char="Ø"/>
             </a:pPr>
             <a:r>
               <a:rPr lang="en-ZA" sz="1800" dirty="0" smtClean="0">
@@ -4589,15 +4625,7 @@
                   <a:schemeClr val="bg1"/>
                 </a:solidFill>
               </a:rPr>
-              <a:t>*Specified </a:t>
-            </a:r>
-            <a:r>
-              <a:rPr lang="en-ZA" sz="1800" dirty="0" err="1" smtClean="0">
-                <a:solidFill>
-                  <a:schemeClr val="bg1"/>
-                </a:solidFill>
-              </a:rPr>
-              <a:t>buzzSpace</a:t>
+              <a:t>Specified </a:t>
             </a:r>
             <a:r>
               <a:rPr lang="en-ZA" sz="1800" dirty="0" smtClean="0">
@@ -4605,17 +4633,13 @@
                   <a:schemeClr val="bg1"/>
                 </a:solidFill>
               </a:rPr>
-              <a:t> should Exist.</a:t>
-            </a:r>
-            <a:endParaRPr lang="en-ZA" sz="1800" dirty="0" smtClean="0">
-              <a:solidFill>
-                <a:schemeClr val="bg1"/>
-              </a:solidFill>
-            </a:endParaRPr>
-          </a:p>
-          <a:p>
-            <a:pPr marL="0" indent="0" algn="just">
-              <a:buNone/>
+              <a:t>role should be valid. </a:t>
+            </a:r>
+          </a:p>
+          <a:p>
+            <a:pPr algn="just">
+              <a:buFont typeface="Wingdings" panose="05000000000000000000" pitchFamily="2" charset="2"/>
+              <a:buChar char="Ø"/>
             </a:pPr>
             <a:r>
               <a:rPr lang="en-ZA" sz="1800" dirty="0" smtClean="0">
@@ -4623,7 +4647,7 @@
                   <a:schemeClr val="bg1"/>
                 </a:solidFill>
               </a:rPr>
-              <a:t>*Specified service should </a:t>
+              <a:t>Minimum </a:t>
             </a:r>
             <a:r>
               <a:rPr lang="en-ZA" sz="1800" dirty="0" smtClean="0">
@@ -4631,41 +4655,7 @@
                   <a:schemeClr val="bg1"/>
                 </a:solidFill>
               </a:rPr>
-              <a:t>Exist</a:t>
-            </a:r>
-            <a:r>
-              <a:rPr lang="en-ZA" sz="1800" dirty="0" smtClean="0">
-                <a:solidFill>
-                  <a:schemeClr val="bg1"/>
-                </a:solidFill>
-              </a:rPr>
-              <a:t>.</a:t>
-            </a:r>
-          </a:p>
-          <a:p>
-            <a:pPr marL="0" indent="0" algn="just">
-              <a:buNone/>
-            </a:pPr>
-            <a:r>
-              <a:rPr lang="en-ZA" sz="1800" dirty="0" smtClean="0">
-                <a:solidFill>
-                  <a:schemeClr val="bg1"/>
-                </a:solidFill>
-              </a:rPr>
-              <a:t>*Specified role should be valid. </a:t>
-            </a:r>
-          </a:p>
-          <a:p>
-            <a:pPr marL="0" indent="0" algn="just">
-              <a:buNone/>
-            </a:pPr>
-            <a:r>
-              <a:rPr lang="en-ZA" sz="1800" dirty="0" smtClean="0">
-                <a:solidFill>
-                  <a:schemeClr val="bg1"/>
-                </a:solidFill>
-              </a:rPr>
-              <a:t>*Minimum Status points should be valid.</a:t>
+              <a:t>Status points should be valid.</a:t>
             </a:r>
           </a:p>
           <a:p>
@@ -4871,7 +4861,7 @@
               <a:buNone/>
             </a:pPr>
             <a:r>
-              <a:rPr lang="en-ZA" sz="2000" b="1" dirty="0" smtClean="0">
+              <a:rPr lang="en-ZA" sz="2000" b="1" u="sng" dirty="0" smtClean="0">
                 <a:solidFill>
                   <a:schemeClr val="bg1"/>
                 </a:solidFill>
@@ -4890,15 +4880,7 @@
                   <a:schemeClr val="bg1"/>
                 </a:solidFill>
               </a:rPr>
-              <a:t>Understanding how </a:t>
-            </a:r>
-            <a:r>
-              <a:rPr lang="en-ZA" sz="2000" dirty="0" smtClean="0">
-                <a:solidFill>
-                  <a:schemeClr val="bg1"/>
-                </a:solidFill>
-              </a:rPr>
-              <a:t>to use the new technologies/applications. Like </a:t>
+              <a:t>Understanding how to use the new technologies/applications. Like </a:t>
             </a:r>
             <a:r>
               <a:rPr lang="en-ZA" sz="2000" dirty="0" err="1" smtClean="0">
@@ -4982,7 +4964,7 @@
               <a:buNone/>
             </a:pPr>
             <a:r>
-              <a:rPr lang="en-ZA" sz="2000" b="1" dirty="0" smtClean="0">
+              <a:rPr lang="en-ZA" sz="2000" b="1" u="sng" dirty="0" smtClean="0">
                 <a:solidFill>
                   <a:schemeClr val="bg1"/>
                 </a:solidFill>
@@ -5031,21 +5013,8 @@
                   <a:schemeClr val="bg1"/>
                 </a:solidFill>
               </a:rPr>
-              <a:t> function/value. To ensure the correct </a:t>
-            </a:r>
-            <a:r>
-              <a:rPr lang="en-ZA" sz="2000" dirty="0" smtClean="0">
-                <a:solidFill>
-                  <a:schemeClr val="bg1"/>
-                </a:solidFill>
-              </a:rPr>
-              <a:t>execution of code.</a:t>
-            </a:r>
-            <a:endParaRPr lang="en-ZA" sz="2000" dirty="0" smtClean="0">
-              <a:solidFill>
-                <a:schemeClr val="bg1"/>
-              </a:solidFill>
-            </a:endParaRPr>
+              <a:t> function/value. To ensure the correct execution of code.</a:t>
+            </a:r>
           </a:p>
           <a:p>
             <a:pPr marL="514350" indent="-514350" algn="just">
@@ -5071,7 +5040,7 @@
     </p:spTree>
     <p:extLst>
       <p:ext uri="{BB962C8B-B14F-4D97-AF65-F5344CB8AC3E}">
-        <p14:creationId xmlns:p14="http://schemas.microsoft.com/office/powerpoint/2010/main" xmlns="" val="3329563870"/>
+        <p14:creationId xmlns:p14="http://schemas.microsoft.com/office/powerpoint/2010/main" val="3329563870"/>
       </p:ext>
     </p:extLst>
   </p:cSld>
@@ -5165,7 +5134,15 @@
                   <a:schemeClr val="bg1"/>
                 </a:solidFill>
               </a:rPr>
-              <a:t>Authors:</a:t>
+              <a:t>Authors</a:t>
+            </a:r>
+            <a:r>
+              <a:rPr lang="en-ZA" sz="2200" u="sng" dirty="0" smtClean="0">
+                <a:solidFill>
+                  <a:schemeClr val="bg1"/>
+                </a:solidFill>
+              </a:rPr>
+              <a:t>: Kale-ab Tessera</a:t>
             </a:r>
             <a:endParaRPr lang="en-ZA" sz="2200" u="sng" dirty="0">
               <a:solidFill>
@@ -5202,7 +5179,7 @@
         </p:spPr>
         <p:txBody>
           <a:bodyPr>
-            <a:normAutofit/>
+            <a:normAutofit fontScale="47500" lnSpcReduction="20000"/>
           </a:bodyPr>
           <a:lstStyle/>
           <a:p>
@@ -5210,37 +5187,80 @@
               <a:buNone/>
             </a:pPr>
             <a:r>
-              <a:rPr lang="en-ZA" sz="2000" b="1" dirty="0" smtClean="0">
-                <a:solidFill>
-                  <a:schemeClr val="bg1"/>
-                </a:solidFill>
-              </a:rPr>
-              <a:t>Description</a:t>
-            </a:r>
-            <a:r>
-              <a:rPr lang="en-ZA" sz="2000" dirty="0" smtClean="0">
-                <a:solidFill>
-                  <a:schemeClr val="bg1"/>
-                </a:solidFill>
-              </a:rPr>
-              <a:t>:</a:t>
+              <a:rPr lang="en-ZA" sz="4200" b="1" u="sng" dirty="0" smtClean="0">
+                <a:solidFill>
+                  <a:schemeClr val="bg1"/>
+                </a:solidFill>
+              </a:rPr>
+              <a:t>Description:</a:t>
             </a:r>
           </a:p>
           <a:p>
             <a:pPr marL="0" indent="0" algn="just">
               <a:buNone/>
             </a:pPr>
-            <a:endParaRPr lang="en-ZA" sz="2000" dirty="0">
-              <a:solidFill>
-                <a:schemeClr val="bg1"/>
-              </a:solidFill>
-            </a:endParaRPr>
+            <a:r>
+              <a:rPr lang="en-ZA" sz="3300" dirty="0" smtClean="0">
+                <a:solidFill>
+                  <a:schemeClr val="bg1"/>
+                </a:solidFill>
+              </a:rPr>
+              <a:t>This function returns a </a:t>
+            </a:r>
+            <a:r>
+              <a:rPr lang="en-ZA" sz="3300" dirty="0" err="1" smtClean="0">
+                <a:solidFill>
+                  <a:schemeClr val="bg1"/>
+                </a:solidFill>
+              </a:rPr>
+              <a:t>json</a:t>
+            </a:r>
+            <a:r>
+              <a:rPr lang="en-ZA" sz="3300" dirty="0" smtClean="0">
+                <a:solidFill>
+                  <a:schemeClr val="bg1"/>
+                </a:solidFill>
+              </a:rPr>
+              <a:t> string and has one parameter -</a:t>
+            </a:r>
+            <a:r>
+              <a:rPr lang="en-ZA" sz="3300" dirty="0" err="1" smtClean="0">
+                <a:solidFill>
+                  <a:schemeClr val="bg1"/>
+                </a:solidFill>
+              </a:rPr>
+              <a:t>buzzSpaceID</a:t>
+            </a:r>
+            <a:r>
+              <a:rPr lang="en-ZA" sz="3300" dirty="0" smtClean="0">
+                <a:solidFill>
+                  <a:schemeClr val="bg1"/>
+                </a:solidFill>
+              </a:rPr>
+              <a:t> which specifies the </a:t>
+            </a:r>
+            <a:r>
+              <a:rPr lang="en-ZA" sz="3300" dirty="0" err="1" smtClean="0">
+                <a:solidFill>
+                  <a:schemeClr val="bg1"/>
+                </a:solidFill>
+              </a:rPr>
+              <a:t>buzzSpace</a:t>
+            </a:r>
+            <a:r>
+              <a:rPr lang="en-ZA" sz="3300" dirty="0" smtClean="0">
+                <a:solidFill>
+                  <a:schemeClr val="bg1"/>
+                </a:solidFill>
+              </a:rPr>
+              <a:t>. </a:t>
+            </a:r>
           </a:p>
           <a:p>
             <a:pPr marL="0" indent="0" algn="just">
               <a:buNone/>
             </a:pPr>
-            <a:endParaRPr lang="en-ZA" sz="2000" dirty="0" smtClean="0">
+            <a:endParaRPr lang="en-ZA" sz="3300" dirty="0" smtClean="0">
               <a:solidFill>
                 <a:schemeClr val="bg1"/>
               </a:solidFill>
@@ -5250,18 +5270,63 @@
             <a:pPr marL="0" indent="0" algn="just">
               <a:buNone/>
             </a:pPr>
-            <a:endParaRPr lang="en-ZA" sz="2000" dirty="0" smtClean="0">
-              <a:solidFill>
-                <a:schemeClr val="bg1"/>
-              </a:solidFill>
-            </a:endParaRPr>
+            <a:r>
+              <a:rPr lang="en-ZA" sz="3300" dirty="0" smtClean="0">
+                <a:solidFill>
+                  <a:schemeClr val="bg1"/>
+                </a:solidFill>
+              </a:rPr>
+              <a:t>The </a:t>
+            </a:r>
+            <a:r>
+              <a:rPr lang="en-ZA" sz="3300" dirty="0" err="1" smtClean="0">
+                <a:solidFill>
+                  <a:schemeClr val="bg1"/>
+                </a:solidFill>
+              </a:rPr>
+              <a:t>json</a:t>
+            </a:r>
+            <a:r>
+              <a:rPr lang="en-ZA" sz="3300" dirty="0" smtClean="0">
+                <a:solidFill>
+                  <a:schemeClr val="bg1"/>
+                </a:solidFill>
+              </a:rPr>
+              <a:t> string that is returned contains all the restrictions for the </a:t>
+            </a:r>
+            <a:r>
+              <a:rPr lang="en-ZA" sz="3300" dirty="0" err="1" smtClean="0">
+                <a:solidFill>
+                  <a:schemeClr val="bg1"/>
+                </a:solidFill>
+              </a:rPr>
+              <a:t>buzzSpace</a:t>
+            </a:r>
+            <a:r>
+              <a:rPr lang="en-ZA" sz="3300" dirty="0" smtClean="0">
+                <a:solidFill>
+                  <a:schemeClr val="bg1"/>
+                </a:solidFill>
+              </a:rPr>
+              <a:t> specified.  </a:t>
+            </a:r>
           </a:p>
           <a:p>
             <a:pPr marL="0" indent="0" algn="just">
               <a:buNone/>
             </a:pPr>
-            <a:r>
-              <a:rPr lang="en-ZA" sz="2000" b="1" dirty="0">
+            <a:endParaRPr lang="en-ZA" sz="2000" b="1" dirty="0">
+              <a:solidFill>
+                <a:schemeClr val="bg1"/>
+              </a:solidFill>
+            </a:endParaRPr>
+          </a:p>
+          <a:p>
+            <a:pPr marL="0" indent="0" algn="just">
+              <a:buNone/>
+            </a:pPr>
+            <a:r>
+              <a:rPr lang="en-ZA" sz="4200" b="1" u="sng" dirty="0">
                 <a:solidFill>
                   <a:schemeClr val="bg1"/>
                 </a:solidFill>
@@ -5273,7 +5338,105 @@
             <a:pPr marL="0" indent="0" algn="just">
               <a:buNone/>
             </a:pPr>
-            <a:endParaRPr lang="en-ZA" dirty="0">
+            <a:endParaRPr lang="en-ZA" sz="2000" b="1" dirty="0">
+              <a:solidFill>
+                <a:schemeClr val="bg1"/>
+              </a:solidFill>
+            </a:endParaRPr>
+          </a:p>
+          <a:p>
+            <a:pPr marL="0" indent="0" algn="just">
+              <a:buNone/>
+            </a:pPr>
+            <a:r>
+              <a:rPr lang="en-ZA" sz="3600" dirty="0" smtClean="0">
+                <a:solidFill>
+                  <a:schemeClr val="bg1"/>
+                </a:solidFill>
+              </a:rPr>
+              <a:t>Pre-conditions: </a:t>
+            </a:r>
+          </a:p>
+          <a:p>
+            <a:pPr algn="just">
+              <a:buFont typeface="Wingdings" panose="05000000000000000000" pitchFamily="2" charset="2"/>
+              <a:buChar char="Ø"/>
+            </a:pPr>
+            <a:r>
+              <a:rPr lang="en-ZA" sz="3600" dirty="0" smtClean="0">
+                <a:solidFill>
+                  <a:schemeClr val="bg1"/>
+                </a:solidFill>
+              </a:rPr>
+              <a:t>The </a:t>
+            </a:r>
+            <a:r>
+              <a:rPr lang="en-ZA" sz="3600" dirty="0" err="1" smtClean="0">
+                <a:solidFill>
+                  <a:schemeClr val="bg1"/>
+                </a:solidFill>
+              </a:rPr>
+              <a:t>BuzzSpace</a:t>
+            </a:r>
+            <a:r>
+              <a:rPr lang="en-ZA" sz="3600" dirty="0" smtClean="0">
+                <a:solidFill>
+                  <a:schemeClr val="bg1"/>
+                </a:solidFill>
+              </a:rPr>
+              <a:t> must exist.</a:t>
+            </a:r>
+          </a:p>
+          <a:p>
+            <a:pPr algn="just">
+              <a:buFont typeface="Wingdings" panose="05000000000000000000" pitchFamily="2" charset="2"/>
+              <a:buChar char="Ø"/>
+            </a:pPr>
+            <a:r>
+              <a:rPr lang="en-ZA" sz="3600" dirty="0" smtClean="0">
+                <a:solidFill>
+                  <a:schemeClr val="bg1"/>
+                </a:solidFill>
+              </a:rPr>
+              <a:t>The caller of the function must be authorised to use this function.</a:t>
+            </a:r>
+          </a:p>
+          <a:p>
+            <a:pPr marL="0" indent="0" algn="just">
+              <a:buNone/>
+            </a:pPr>
+            <a:endParaRPr lang="en-ZA" sz="3600" dirty="0" smtClean="0">
+              <a:solidFill>
+                <a:schemeClr val="bg1"/>
+              </a:solidFill>
+            </a:endParaRPr>
+          </a:p>
+          <a:p>
+            <a:pPr marL="0" indent="0" algn="just">
+              <a:buNone/>
+            </a:pPr>
+            <a:r>
+              <a:rPr lang="en-ZA" sz="3600" dirty="0" smtClean="0">
+                <a:solidFill>
+                  <a:schemeClr val="bg1"/>
+                </a:solidFill>
+              </a:rPr>
+              <a:t>Post-conditions:  </a:t>
+            </a:r>
+          </a:p>
+          <a:p>
+            <a:pPr marL="0" indent="0" algn="just">
+              <a:buNone/>
+            </a:pPr>
+            <a:r>
+              <a:rPr lang="en-ZA" sz="3600" dirty="0" smtClean="0">
+                <a:solidFill>
+                  <a:schemeClr val="bg1"/>
+                </a:solidFill>
+              </a:rPr>
+              <a:t>None</a:t>
+            </a:r>
+            <a:endParaRPr lang="en-ZA" sz="3600" dirty="0" smtClean="0">
               <a:solidFill>
                 <a:schemeClr val="bg1"/>
               </a:solidFill>
@@ -5494,49 +5657,9 @@
           </a:lstStyle>
           <a:p>
             <a:pPr marL="0" indent="0" algn="just">
-              <a:buFont typeface="Arial" pitchFamily="34" charset="0"/>
-              <a:buNone/>
-            </a:pPr>
-            <a:r>
-              <a:rPr lang="en-ZA" sz="2000" b="1" dirty="0" smtClean="0">
-                <a:solidFill>
-                  <a:schemeClr val="bg1"/>
-                </a:solidFill>
-              </a:rPr>
-              <a:t>Challenges Faced: </a:t>
-            </a:r>
-          </a:p>
-          <a:p>
-            <a:pPr marL="514350" indent="-514350" algn="just">
-              <a:buFont typeface="Arial" pitchFamily="34" charset="0"/>
-              <a:buAutoNum type="arabicPeriod"/>
-            </a:pPr>
-            <a:r>
-              <a:rPr lang="en-ZA" sz="2000" dirty="0" smtClean="0">
-                <a:solidFill>
-                  <a:schemeClr val="bg1"/>
-                </a:solidFill>
-              </a:rPr>
-              <a:t>…</a:t>
-            </a:r>
-          </a:p>
-          <a:p>
-            <a:pPr marL="514350" indent="-514350" algn="just">
-              <a:buFont typeface="Arial" pitchFamily="34" charset="0"/>
-              <a:buAutoNum type="arabicPeriod"/>
-            </a:pPr>
-            <a:endParaRPr lang="en-ZA" sz="2000" dirty="0">
-              <a:solidFill>
-                <a:schemeClr val="bg1"/>
-              </a:solidFill>
-            </a:endParaRPr>
-          </a:p>
-          <a:p>
-            <a:pPr marL="514350" indent="-514350" algn="just">
-              <a:buFont typeface="Arial" pitchFamily="34" charset="0"/>
-              <a:buAutoNum type="arabicPeriod"/>
-            </a:pPr>
-            <a:endParaRPr lang="en-ZA" sz="2000" dirty="0">
+              <a:buNone/>
+            </a:pPr>
+            <a:endParaRPr lang="en-ZA" sz="2000" b="1" dirty="0" smtClean="0">
               <a:solidFill>
                 <a:schemeClr val="bg1"/>
               </a:solidFill>
@@ -5547,7 +5670,69 @@
               <a:buNone/>
             </a:pPr>
             <a:r>
-              <a:rPr lang="en-ZA" sz="2000" b="1" dirty="0" smtClean="0">
+              <a:rPr lang="en-ZA" sz="2000" b="1" u="sng" dirty="0" smtClean="0">
+                <a:solidFill>
+                  <a:schemeClr val="bg1"/>
+                </a:solidFill>
+              </a:rPr>
+              <a:t>Challenges </a:t>
+            </a:r>
+            <a:r>
+              <a:rPr lang="en-ZA" sz="2000" b="1" u="sng" dirty="0">
+                <a:solidFill>
+                  <a:schemeClr val="bg1"/>
+                </a:solidFill>
+              </a:rPr>
+              <a:t>Faced: </a:t>
+            </a:r>
+          </a:p>
+          <a:p>
+            <a:pPr marL="0" indent="0" algn="just">
+              <a:buNone/>
+            </a:pPr>
+            <a:r>
+              <a:rPr lang="en-ZA" sz="1700" dirty="0">
+                <a:solidFill>
+                  <a:schemeClr val="bg1"/>
+                </a:solidFill>
+              </a:rPr>
+              <a:t>1. Integration with other functions due to multiple schemas being used.</a:t>
+            </a:r>
+          </a:p>
+          <a:p>
+            <a:pPr marL="0" indent="0" algn="just">
+              <a:buNone/>
+            </a:pPr>
+            <a:r>
+              <a:rPr lang="en-ZA" sz="1700" dirty="0" smtClean="0">
+                <a:solidFill>
+                  <a:schemeClr val="bg1"/>
+                </a:solidFill>
+              </a:rPr>
+              <a:t>2. Constant changing of schema by top level.</a:t>
+            </a:r>
+            <a:endParaRPr lang="en-ZA" sz="1700" dirty="0">
+              <a:solidFill>
+                <a:schemeClr val="bg1"/>
+              </a:solidFill>
+            </a:endParaRPr>
+          </a:p>
+          <a:p>
+            <a:pPr marL="0" indent="0" algn="just">
+              <a:buNone/>
+            </a:pPr>
+            <a:endParaRPr lang="en-ZA" sz="2000" b="1" dirty="0">
+              <a:solidFill>
+                <a:schemeClr val="bg1"/>
+              </a:solidFill>
+            </a:endParaRPr>
+          </a:p>
+          <a:p>
+            <a:pPr marL="0" indent="0" algn="just">
+              <a:buNone/>
+            </a:pPr>
+            <a:r>
+              <a:rPr lang="en-ZA" sz="2000" b="1" u="sng" dirty="0">
                 <a:solidFill>
                   <a:schemeClr val="bg1"/>
                 </a:solidFill>
@@ -5556,17 +5741,16 @@
             </a:r>
           </a:p>
           <a:p>
-            <a:pPr marL="514350" indent="-514350" algn="just">
-              <a:buFont typeface="+mj-lt"/>
-              <a:buAutoNum type="arabicPeriod"/>
-            </a:pPr>
-            <a:r>
-              <a:rPr lang="en-ZA" sz="2000" dirty="0" smtClean="0">
-                <a:solidFill>
-                  <a:schemeClr val="bg1"/>
-                </a:solidFill>
-              </a:rPr>
-              <a:t>…</a:t>
+            <a:pPr marL="0" indent="0" algn="just">
+              <a:buNone/>
+            </a:pPr>
+            <a:r>
+              <a:rPr lang="en-ZA" sz="1600" dirty="0">
+                <a:solidFill>
+                  <a:schemeClr val="bg1"/>
+                </a:solidFill>
+              </a:rPr>
+              <a:t>1. A global Schema was used and required.</a:t>
             </a:r>
           </a:p>
           <a:p>
@@ -5574,7 +5758,15 @@
               <a:buFont typeface="Arial" pitchFamily="34" charset="0"/>
               <a:buNone/>
             </a:pPr>
-            <a:endParaRPr lang="en-ZA" dirty="0" smtClean="0">
+            <a:r>
+              <a:rPr lang="en-ZA" sz="1600" dirty="0" smtClean="0">
+                <a:solidFill>
+                  <a:schemeClr val="bg1"/>
+                </a:solidFill>
+              </a:rPr>
+              <a:t>2. This required some patience and late changes were made.</a:t>
+            </a:r>
+            <a:endParaRPr lang="en-ZA" sz="1600" dirty="0" smtClean="0">
               <a:solidFill>
                 <a:schemeClr val="bg1"/>
               </a:solidFill>
@@ -5620,7 +5812,7 @@
     </p:spTree>
     <p:extLst>
       <p:ext uri="{BB962C8B-B14F-4D97-AF65-F5344CB8AC3E}">
-        <p14:creationId xmlns:p14="http://schemas.microsoft.com/office/powerpoint/2010/main" xmlns="" val="446071776"/>
+        <p14:creationId xmlns:p14="http://schemas.microsoft.com/office/powerpoint/2010/main" val="446071776"/>
       </p:ext>
     </p:extLst>
   </p:cSld>
@@ -5767,7 +5959,7 @@
               <a:buNone/>
             </a:pPr>
             <a:r>
-              <a:rPr lang="en-ZA" sz="2000" b="1" dirty="0" smtClean="0">
+              <a:rPr lang="en-ZA" sz="2000" b="1" u="sng" dirty="0" smtClean="0">
                 <a:solidFill>
                   <a:schemeClr val="bg1"/>
                 </a:solidFill>
@@ -5775,7 +5967,7 @@
               <a:t>Description</a:t>
             </a:r>
             <a:r>
-              <a:rPr lang="en-ZA" sz="2000" dirty="0" smtClean="0">
+              <a:rPr lang="en-ZA" sz="2000" u="sng" dirty="0" smtClean="0">
                 <a:solidFill>
                   <a:schemeClr val="bg1"/>
                 </a:solidFill>
@@ -5824,7 +6016,7 @@
               <a:buNone/>
             </a:pPr>
             <a:r>
-              <a:rPr lang="en-ZA" sz="2000" b="1" dirty="0">
+              <a:rPr lang="en-ZA" sz="2000" b="1" u="sng" dirty="0">
                 <a:solidFill>
                   <a:schemeClr val="bg1"/>
                 </a:solidFill>
@@ -6132,7 +6324,7 @@
               <a:buNone/>
             </a:pPr>
             <a:r>
-              <a:rPr lang="en-ZA" sz="6200" b="1" dirty="0" smtClean="0">
+              <a:rPr lang="en-ZA" sz="6200" b="1" u="sng" dirty="0" smtClean="0">
                 <a:solidFill>
                   <a:schemeClr val="bg1"/>
                 </a:solidFill>
@@ -6175,7 +6367,7 @@
               <a:buNone/>
             </a:pPr>
             <a:r>
-              <a:rPr lang="en-ZA" sz="6200" b="1" dirty="0" smtClean="0">
+              <a:rPr lang="en-ZA" sz="6200" b="1" u="sng" dirty="0" smtClean="0">
                 <a:solidFill>
                   <a:schemeClr val="bg1"/>
                 </a:solidFill>
@@ -6228,7 +6420,7 @@
     </p:spTree>
     <p:extLst>
       <p:ext uri="{BB962C8B-B14F-4D97-AF65-F5344CB8AC3E}">
-        <p14:creationId xmlns:p14="http://schemas.microsoft.com/office/powerpoint/2010/main" xmlns="" val="4160446826"/>
+        <p14:creationId xmlns:p14="http://schemas.microsoft.com/office/powerpoint/2010/main" val="4160446826"/>
       </p:ext>
     </p:extLst>
   </p:cSld>
@@ -6322,7 +6514,23 @@
                   <a:schemeClr val="bg1"/>
                 </a:solidFill>
               </a:rPr>
-              <a:t>Authors:</a:t>
+              <a:t>Authors</a:t>
+            </a:r>
+            <a:r>
+              <a:rPr lang="en-ZA" sz="2200" u="sng" dirty="0" smtClean="0">
+                <a:solidFill>
+                  <a:schemeClr val="bg1"/>
+                </a:solidFill>
+              </a:rPr>
+              <a:t>: Kale-ab Tessera, Armand </a:t>
+            </a:r>
+            <a:r>
+              <a:rPr lang="en-ZA" sz="2200" u="sng" dirty="0" err="1" smtClean="0">
+                <a:solidFill>
+                  <a:schemeClr val="bg1"/>
+                </a:solidFill>
+              </a:rPr>
+              <a:t>Pieterse</a:t>
             </a:r>
             <a:endParaRPr lang="en-ZA" sz="2200" u="sng" dirty="0">
               <a:solidFill>
@@ -6359,7 +6567,7 @@
         </p:spPr>
         <p:txBody>
           <a:bodyPr>
-            <a:normAutofit/>
+            <a:normAutofit fontScale="25000" lnSpcReduction="20000"/>
           </a:bodyPr>
           <a:lstStyle/>
           <a:p>
@@ -6367,26 +6575,138 @@
               <a:buNone/>
             </a:pPr>
             <a:r>
-              <a:rPr lang="en-ZA" sz="2000" b="1" dirty="0" smtClean="0">
-                <a:solidFill>
-                  <a:schemeClr val="bg1"/>
-                </a:solidFill>
-              </a:rPr>
-              <a:t>Description</a:t>
-            </a:r>
-            <a:r>
-              <a:rPr lang="en-ZA" sz="2000" dirty="0" smtClean="0">
-                <a:solidFill>
-                  <a:schemeClr val="bg1"/>
-                </a:solidFill>
-              </a:rPr>
-              <a:t>:</a:t>
+              <a:rPr lang="en-ZA" sz="8000" b="1" u="sng" dirty="0" smtClean="0">
+                <a:solidFill>
+                  <a:schemeClr val="bg1"/>
+                </a:solidFill>
+              </a:rPr>
+              <a:t>Description:</a:t>
             </a:r>
           </a:p>
           <a:p>
             <a:pPr marL="0" indent="0" algn="just">
               <a:buNone/>
             </a:pPr>
+            <a:r>
+              <a:rPr lang="en-ZA" sz="6400" dirty="0">
+                <a:solidFill>
+                  <a:schemeClr val="bg1"/>
+                </a:solidFill>
+              </a:rPr>
+              <a:t>Void function. Accepts three parameters-  </a:t>
+            </a:r>
+            <a:r>
+              <a:rPr lang="en-ZA" sz="6400" dirty="0" err="1">
+                <a:solidFill>
+                  <a:schemeClr val="bg1"/>
+                </a:solidFill>
+              </a:rPr>
+              <a:t>authorizedID</a:t>
+            </a:r>
+            <a:r>
+              <a:rPr lang="en-ZA" sz="6400" dirty="0">
+                <a:solidFill>
+                  <a:schemeClr val="bg1"/>
+                </a:solidFill>
+              </a:rPr>
+              <a:t>, role and </a:t>
+            </a:r>
+            <a:r>
+              <a:rPr lang="en-ZA" sz="6400" dirty="0" err="1">
+                <a:solidFill>
+                  <a:schemeClr val="bg1"/>
+                </a:solidFill>
+              </a:rPr>
+              <a:t>statusPoints</a:t>
+            </a:r>
+            <a:r>
+              <a:rPr lang="en-ZA" sz="6400" dirty="0">
+                <a:solidFill>
+                  <a:schemeClr val="bg1"/>
+                </a:solidFill>
+              </a:rPr>
+              <a:t>. </a:t>
+            </a:r>
+          </a:p>
+          <a:p>
+            <a:pPr marL="0" indent="0" algn="just">
+              <a:buNone/>
+            </a:pPr>
+            <a:endParaRPr lang="en-ZA" sz="6400" dirty="0">
+              <a:solidFill>
+                <a:schemeClr val="bg1"/>
+              </a:solidFill>
+            </a:endParaRPr>
+          </a:p>
+          <a:p>
+            <a:pPr marL="0" indent="0" algn="just">
+              <a:buNone/>
+            </a:pPr>
+            <a:r>
+              <a:rPr lang="en-ZA" sz="6400" dirty="0">
+                <a:solidFill>
+                  <a:schemeClr val="bg1"/>
+                </a:solidFill>
+              </a:rPr>
+              <a:t>The function changes the role and </a:t>
+            </a:r>
+            <a:r>
+              <a:rPr lang="en-ZA" sz="6400" dirty="0" err="1">
+                <a:solidFill>
+                  <a:schemeClr val="bg1"/>
+                </a:solidFill>
+              </a:rPr>
+              <a:t>statusPoints</a:t>
+            </a:r>
+            <a:r>
+              <a:rPr lang="en-ZA" sz="6400" dirty="0">
+                <a:solidFill>
+                  <a:schemeClr val="bg1"/>
+                </a:solidFill>
+              </a:rPr>
+              <a:t> of the authorization restriction specified by </a:t>
+            </a:r>
+            <a:r>
+              <a:rPr lang="en-ZA" sz="6400" dirty="0" err="1">
+                <a:solidFill>
+                  <a:schemeClr val="bg1"/>
+                </a:solidFill>
+              </a:rPr>
+              <a:t>authorizedID</a:t>
+            </a:r>
+            <a:r>
+              <a:rPr lang="en-ZA" sz="6400" dirty="0">
+                <a:solidFill>
+                  <a:schemeClr val="bg1"/>
+                </a:solidFill>
+              </a:rPr>
+              <a:t>.</a:t>
+            </a:r>
+          </a:p>
+          <a:p>
+            <a:pPr marL="0" indent="0" algn="just">
+              <a:buNone/>
+            </a:pPr>
+            <a:endParaRPr lang="en-ZA" sz="5200" dirty="0">
+              <a:solidFill>
+                <a:schemeClr val="bg1"/>
+              </a:solidFill>
+            </a:endParaRPr>
+          </a:p>
+          <a:p>
+            <a:pPr marL="0" indent="0" algn="just">
+              <a:buNone/>
+            </a:pPr>
+            <a:endParaRPr lang="en-ZA" sz="2000" dirty="0" smtClean="0">
+              <a:solidFill>
+                <a:schemeClr val="bg1"/>
+              </a:solidFill>
+            </a:endParaRPr>
+          </a:p>
+          <a:p>
+            <a:pPr marL="0" indent="0" algn="just">
+              <a:buNone/>
+            </a:pPr>
             <a:endParaRPr lang="en-ZA" sz="2000" dirty="0">
               <a:solidFill>
                 <a:schemeClr val="bg1"/>
@@ -6407,7 +6727,7 @@
             <a:pPr marL="0" indent="0" algn="just">
               <a:buNone/>
             </a:pPr>
-            <a:endParaRPr lang="en-ZA" sz="2000" dirty="0" smtClean="0">
+            <a:endParaRPr lang="en-ZA" sz="2000" dirty="0">
               <a:solidFill>
                 <a:schemeClr val="bg1"/>
               </a:solidFill>
@@ -6418,7 +6738,7 @@
               <a:buNone/>
             </a:pPr>
             <a:r>
-              <a:rPr lang="en-ZA" sz="2000" b="1" dirty="0">
+              <a:rPr lang="en-ZA" sz="8000" b="1" u="sng" dirty="0">
                 <a:solidFill>
                   <a:schemeClr val="bg1"/>
                 </a:solidFill>
@@ -6430,51 +6750,145 @@
             <a:pPr marL="0" indent="0" algn="just">
               <a:buNone/>
             </a:pPr>
-            <a:endParaRPr lang="en-ZA" dirty="0">
-              <a:solidFill>
-                <a:schemeClr val="bg1"/>
-              </a:solidFill>
-            </a:endParaRPr>
+            <a:r>
+              <a:rPr lang="en-ZA" sz="6400" dirty="0">
+                <a:solidFill>
+                  <a:schemeClr val="bg1"/>
+                </a:solidFill>
+              </a:rPr>
+              <a:t>Pre:</a:t>
+            </a:r>
           </a:p>
           <a:p>
             <a:pPr marL="0" indent="0" algn="just">
               <a:buNone/>
             </a:pPr>
-            <a:endParaRPr lang="en-ZA" dirty="0" smtClean="0">
-              <a:solidFill>
-                <a:schemeClr val="bg1"/>
-              </a:solidFill>
-            </a:endParaRPr>
-          </a:p>
-          <a:p>
-            <a:pPr marL="0" indent="0">
-              <a:buNone/>
-            </a:pPr>
-            <a:r>
-              <a:rPr lang="en-ZA" dirty="0" smtClean="0">
-                <a:solidFill>
-                  <a:schemeClr val="bg1"/>
-                </a:solidFill>
-              </a:rPr>
-              <a:t>	</a:t>
-            </a:r>
-          </a:p>
-          <a:p>
-            <a:endParaRPr lang="en-ZA" dirty="0" smtClean="0">
-              <a:solidFill>
-                <a:schemeClr val="bg1"/>
-              </a:solidFill>
-            </a:endParaRPr>
-          </a:p>
-          <a:p>
-            <a:endParaRPr lang="en-ZA" dirty="0">
-              <a:solidFill>
-                <a:schemeClr val="bg1"/>
-              </a:solidFill>
-            </a:endParaRPr>
-          </a:p>
-          <a:p>
-            <a:endParaRPr lang="en-ZA" dirty="0">
+            <a:r>
+              <a:rPr lang="en-ZA" sz="6400" dirty="0">
+                <a:solidFill>
+                  <a:schemeClr val="bg1"/>
+                </a:solidFill>
+              </a:rPr>
+              <a:t>The authorization must exist.</a:t>
+            </a:r>
+          </a:p>
+          <a:p>
+            <a:pPr marL="0" indent="0" algn="just">
+              <a:buNone/>
+            </a:pPr>
+            <a:r>
+              <a:rPr lang="en-ZA" sz="6400" dirty="0">
+                <a:solidFill>
+                  <a:schemeClr val="bg1"/>
+                </a:solidFill>
+              </a:rPr>
+              <a:t>The caller of the function must have authorization to use this function</a:t>
+            </a:r>
+            <a:r>
+              <a:rPr lang="en-ZA" sz="6400" dirty="0" smtClean="0">
+                <a:solidFill>
+                  <a:schemeClr val="bg1"/>
+                </a:solidFill>
+              </a:rPr>
+              <a:t>.</a:t>
+            </a:r>
+          </a:p>
+          <a:p>
+            <a:pPr marL="0" indent="0" algn="just">
+              <a:buNone/>
+            </a:pPr>
+            <a:r>
+              <a:rPr lang="en-ZA" sz="6400" dirty="0" smtClean="0">
+                <a:solidFill>
+                  <a:schemeClr val="bg1"/>
+                </a:solidFill>
+              </a:rPr>
+              <a:t>The new role and </a:t>
+            </a:r>
+            <a:r>
+              <a:rPr lang="en-ZA" sz="6400" dirty="0" err="1" smtClean="0">
+                <a:solidFill>
+                  <a:schemeClr val="bg1"/>
+                </a:solidFill>
+              </a:rPr>
+              <a:t>statusPoint</a:t>
+            </a:r>
+            <a:r>
+              <a:rPr lang="en-ZA" sz="6400" dirty="0" smtClean="0">
+                <a:solidFill>
+                  <a:schemeClr val="bg1"/>
+                </a:solidFill>
+              </a:rPr>
+              <a:t> values must be valid.</a:t>
+            </a:r>
+            <a:endParaRPr lang="en-ZA" sz="6400" dirty="0">
+              <a:solidFill>
+                <a:schemeClr val="bg1"/>
+              </a:solidFill>
+            </a:endParaRPr>
+          </a:p>
+          <a:p>
+            <a:pPr marL="0" indent="0" algn="just">
+              <a:buNone/>
+            </a:pPr>
+            <a:endParaRPr lang="en-ZA" sz="6400" dirty="0">
+              <a:solidFill>
+                <a:schemeClr val="bg1"/>
+              </a:solidFill>
+            </a:endParaRPr>
+          </a:p>
+          <a:p>
+            <a:pPr marL="0" indent="0" algn="just">
+              <a:buNone/>
+            </a:pPr>
+            <a:r>
+              <a:rPr lang="en-ZA" sz="6400" dirty="0">
+                <a:solidFill>
+                  <a:schemeClr val="bg1"/>
+                </a:solidFill>
+              </a:rPr>
+              <a:t>Post: </a:t>
+            </a:r>
+          </a:p>
+          <a:p>
+            <a:pPr marL="0" indent="0" algn="just">
+              <a:buNone/>
+            </a:pPr>
+            <a:r>
+              <a:rPr lang="en-ZA" sz="6400" dirty="0">
+                <a:solidFill>
+                  <a:schemeClr val="bg1"/>
+                </a:solidFill>
+              </a:rPr>
+              <a:t>The role and </a:t>
+            </a:r>
+            <a:r>
+              <a:rPr lang="en-ZA" sz="6400" dirty="0" err="1">
+                <a:solidFill>
+                  <a:schemeClr val="bg1"/>
+                </a:solidFill>
+              </a:rPr>
+              <a:t>statusPoints</a:t>
+            </a:r>
+            <a:r>
+              <a:rPr lang="en-ZA" sz="6400" dirty="0">
+                <a:solidFill>
+                  <a:schemeClr val="bg1"/>
+                </a:solidFill>
+              </a:rPr>
+              <a:t> must be altered accordingly.</a:t>
+            </a:r>
+            <a:endParaRPr lang="en-ZA" sz="6400" dirty="0" smtClean="0">
+              <a:solidFill>
+                <a:schemeClr val="bg1"/>
+              </a:solidFill>
+            </a:endParaRPr>
+          </a:p>
+          <a:p>
+            <a:pPr marL="0" indent="0" algn="just">
+              <a:buNone/>
+            </a:pPr>
+            <a:endParaRPr lang="en-ZA" sz="3600" dirty="0" smtClean="0">
               <a:solidFill>
                 <a:schemeClr val="bg1"/>
               </a:solidFill>
@@ -6651,11 +7065,10 @@
           </a:lstStyle>
           <a:p>
             <a:pPr marL="0" indent="0" algn="just">
-              <a:buFont typeface="Arial" pitchFamily="34" charset="0"/>
-              <a:buNone/>
-            </a:pPr>
-            <a:r>
-              <a:rPr lang="en-ZA" sz="2000" b="1" dirty="0" smtClean="0">
+              <a:buNone/>
+            </a:pPr>
+            <a:r>
+              <a:rPr lang="en-ZA" sz="2000" b="1" u="sng" dirty="0">
                 <a:solidFill>
                   <a:schemeClr val="bg1"/>
                 </a:solidFill>
@@ -6664,47 +7077,44 @@
             </a:r>
           </a:p>
           <a:p>
-            <a:pPr marL="514350" indent="-514350" algn="just">
-              <a:buFont typeface="Arial" pitchFamily="34" charset="0"/>
-              <a:buAutoNum type="arabicPeriod"/>
-            </a:pPr>
-            <a:r>
-              <a:rPr lang="en-ZA" sz="2000" dirty="0" smtClean="0">
-                <a:solidFill>
-                  <a:schemeClr val="bg1"/>
-                </a:solidFill>
-              </a:rPr>
-              <a:t>…</a:t>
-            </a:r>
-          </a:p>
-          <a:p>
-            <a:pPr marL="514350" indent="-514350" algn="just">
-              <a:buFont typeface="Arial" pitchFamily="34" charset="0"/>
-              <a:buAutoNum type="arabicPeriod"/>
-            </a:pPr>
-            <a:endParaRPr lang="en-ZA" sz="2000" dirty="0">
-              <a:solidFill>
-                <a:schemeClr val="bg1"/>
-              </a:solidFill>
-            </a:endParaRPr>
-          </a:p>
-          <a:p>
-            <a:pPr marL="514350" indent="-514350" algn="just">
-              <a:buFont typeface="Arial" pitchFamily="34" charset="0"/>
-              <a:buAutoNum type="arabicPeriod"/>
-            </a:pPr>
-            <a:endParaRPr lang="en-ZA" sz="2000" dirty="0">
-              <a:solidFill>
-                <a:schemeClr val="bg1"/>
-              </a:solidFill>
-            </a:endParaRPr>
-          </a:p>
-          <a:p>
             <a:pPr marL="0" indent="0" algn="just">
               <a:buNone/>
             </a:pPr>
             <a:r>
-              <a:rPr lang="en-ZA" sz="2000" b="1" dirty="0" smtClean="0">
+              <a:rPr lang="en-ZA" sz="1700" dirty="0">
+                <a:solidFill>
+                  <a:schemeClr val="bg1"/>
+                </a:solidFill>
+              </a:rPr>
+              <a:t>Having the changes made to a record persist. </a:t>
+            </a:r>
+          </a:p>
+          <a:p>
+            <a:pPr marL="0" indent="0" algn="just">
+              <a:buNone/>
+            </a:pPr>
+            <a:endParaRPr lang="en-ZA" sz="2000" b="1" dirty="0">
+              <a:solidFill>
+                <a:schemeClr val="bg1"/>
+              </a:solidFill>
+            </a:endParaRPr>
+          </a:p>
+          <a:p>
+            <a:pPr marL="0" indent="0" algn="just">
+              <a:buNone/>
+            </a:pPr>
+            <a:endParaRPr lang="en-ZA" sz="2000" b="1" dirty="0">
+              <a:solidFill>
+                <a:schemeClr val="bg1"/>
+              </a:solidFill>
+            </a:endParaRPr>
+          </a:p>
+          <a:p>
+            <a:pPr marL="0" indent="0" algn="just">
+              <a:buNone/>
+            </a:pPr>
+            <a:r>
+              <a:rPr lang="en-ZA" sz="2000" b="1" u="sng" dirty="0">
                 <a:solidFill>
                   <a:schemeClr val="bg1"/>
                 </a:solidFill>
@@ -6713,18 +7123,27 @@
             </a:r>
           </a:p>
           <a:p>
-            <a:pPr marL="514350" indent="-514350" algn="just">
-              <a:buFont typeface="+mj-lt"/>
-              <a:buAutoNum type="arabicPeriod"/>
-            </a:pPr>
-            <a:r>
-              <a:rPr lang="en-ZA" sz="2000" dirty="0" smtClean="0">
-                <a:solidFill>
-                  <a:schemeClr val="bg1"/>
-                </a:solidFill>
-              </a:rPr>
-              <a:t>…</a:t>
-            </a:r>
+            <a:pPr marL="0" indent="0" algn="just">
+              <a:buNone/>
+            </a:pPr>
+            <a:r>
+              <a:rPr lang="en-ZA" sz="1700" dirty="0">
+                <a:solidFill>
+                  <a:schemeClr val="bg1"/>
+                </a:solidFill>
+              </a:rPr>
+              <a:t>Research was done and the save function for a record in a database was found and implemented.</a:t>
+            </a:r>
+          </a:p>
+          <a:p>
+            <a:pPr marL="0" indent="0" algn="just">
+              <a:buNone/>
+            </a:pPr>
+            <a:endParaRPr lang="en-ZA" sz="2000" b="1" dirty="0">
+              <a:solidFill>
+                <a:schemeClr val="bg1"/>
+              </a:solidFill>
+            </a:endParaRPr>
           </a:p>
           <a:p>
             <a:pPr marL="0" indent="0" algn="just">
@@ -6777,7 +7196,7 @@
     </p:spTree>
     <p:extLst>
       <p:ext uri="{BB962C8B-B14F-4D97-AF65-F5344CB8AC3E}">
-        <p14:creationId xmlns:p14="http://schemas.microsoft.com/office/powerpoint/2010/main" xmlns="" val="109087637"/>
+        <p14:creationId xmlns:p14="http://schemas.microsoft.com/office/powerpoint/2010/main" val="109087637"/>
       </p:ext>
     </p:extLst>
   </p:cSld>
@@ -6977,7 +7396,7 @@
     </p:spTree>
     <p:extLst>
       <p:ext uri="{BB962C8B-B14F-4D97-AF65-F5344CB8AC3E}">
-        <p14:creationId xmlns:p14="http://schemas.microsoft.com/office/powerpoint/2010/main" xmlns="" val="176429030"/>
+        <p14:creationId xmlns:p14="http://schemas.microsoft.com/office/powerpoint/2010/main" val="176429030"/>
       </p:ext>
     </p:extLst>
   </p:cSld>
@@ -7186,7 +7605,7 @@
     </p:spTree>
     <p:extLst>
       <p:ext uri="{BB962C8B-B14F-4D97-AF65-F5344CB8AC3E}">
-        <p14:creationId xmlns:p14="http://schemas.microsoft.com/office/powerpoint/2010/main" xmlns="" val="1129193988"/>
+        <p14:creationId xmlns:p14="http://schemas.microsoft.com/office/powerpoint/2010/main" val="1129193988"/>
       </p:ext>
     </p:extLst>
   </p:cSld>

</xml_diff>